<commit_message>
bai tap js day3
</commit_message>
<xml_diff>
--- a/Slide/TungNT72.pptx
+++ b/Slide/TungNT72.pptx
@@ -5,13 +5,18 @@
     <p:sldMasterId id="2147483648" r:id="rId1"/>
   </p:sldMasterIdLst>
   <p:notesMasterIdLst>
-    <p:notesMasterId r:id="rId6"/>
+    <p:notesMasterId r:id="rId11"/>
   </p:notesMasterIdLst>
   <p:sldIdLst>
     <p:sldId id="256" r:id="rId2"/>
     <p:sldId id="257" r:id="rId3"/>
     <p:sldId id="258" r:id="rId4"/>
     <p:sldId id="259" r:id="rId5"/>
+    <p:sldId id="260" r:id="rId6"/>
+    <p:sldId id="261" r:id="rId7"/>
+    <p:sldId id="262" r:id="rId8"/>
+    <p:sldId id="263" r:id="rId9"/>
+    <p:sldId id="264" r:id="rId10"/>
   </p:sldIdLst>
   <p:sldSz cx="12192000" cy="6858000"/>
   <p:notesSz cx="6858000" cy="9144000"/>
@@ -9596,7 +9601,7 @@
         </p:nvSpPr>
         <p:spPr>
           <a:xfrm>
-            <a:off x="2688567" y="3529710"/>
+            <a:off x="2697193" y="3529710"/>
             <a:ext cx="8413630" cy="1938992"/>
           </a:xfrm>
           <a:prstGeom prst="rect">
@@ -9885,6 +9890,299 @@
               </a:rPr>
               <a:t>2) … factorial(0) .</a:t>
             </a:r>
+          </a:p>
+          <a:p>
+            <a:pPr>
+              <a:lnSpc>
+                <a:spcPct val="200000"/>
+              </a:lnSpc>
+            </a:pPr>
+            <a:r>
+              <a:rPr lang="en-US" sz="2000" dirty="0" err="1" smtClean="0">
+                <a:solidFill>
+                  <a:srgbClr val="0070C0"/>
+                </a:solidFill>
+                <a:latin typeface="Tahoma" panose="020B0604030504040204" pitchFamily="34" charset="0"/>
+                <a:cs typeface="Tahoma" panose="020B0604030504040204" pitchFamily="34" charset="0"/>
+              </a:rPr>
+              <a:t>Và</a:t>
+            </a:r>
+            <a:r>
+              <a:rPr lang="en-US" sz="2000" dirty="0" smtClean="0">
+                <a:solidFill>
+                  <a:srgbClr val="0070C0"/>
+                </a:solidFill>
+                <a:latin typeface="Tahoma" panose="020B0604030504040204" pitchFamily="34" charset="0"/>
+                <a:cs typeface="Tahoma" panose="020B0604030504040204" pitchFamily="34" charset="0"/>
+              </a:rPr>
+              <a:t> </a:t>
+            </a:r>
+            <a:r>
+              <a:rPr lang="en-US" sz="2000" dirty="0" err="1" smtClean="0">
+                <a:solidFill>
+                  <a:srgbClr val="0070C0"/>
+                </a:solidFill>
+                <a:latin typeface="Tahoma" panose="020B0604030504040204" pitchFamily="34" charset="0"/>
+                <a:cs typeface="Tahoma" panose="020B0604030504040204" pitchFamily="34" charset="0"/>
+              </a:rPr>
+              <a:t>thứ</a:t>
+            </a:r>
+            <a:r>
+              <a:rPr lang="en-US" sz="2000" dirty="0" smtClean="0">
+                <a:solidFill>
+                  <a:srgbClr val="0070C0"/>
+                </a:solidFill>
+                <a:latin typeface="Tahoma" panose="020B0604030504040204" pitchFamily="34" charset="0"/>
+                <a:cs typeface="Tahoma" panose="020B0604030504040204" pitchFamily="34" charset="0"/>
+              </a:rPr>
+              <a:t> </a:t>
+            </a:r>
+            <a:r>
+              <a:rPr lang="en-US" sz="2000" dirty="0" err="1" smtClean="0">
+                <a:solidFill>
+                  <a:srgbClr val="0070C0"/>
+                </a:solidFill>
+                <a:latin typeface="Tahoma" panose="020B0604030504040204" pitchFamily="34" charset="0"/>
+                <a:cs typeface="Tahoma" panose="020B0604030504040204" pitchFamily="34" charset="0"/>
+              </a:rPr>
+              <a:t>tự</a:t>
+            </a:r>
+            <a:r>
+              <a:rPr lang="en-US" sz="2000" dirty="0" smtClean="0">
+                <a:solidFill>
+                  <a:srgbClr val="0070C0"/>
+                </a:solidFill>
+                <a:latin typeface="Tahoma" panose="020B0604030504040204" pitchFamily="34" charset="0"/>
+                <a:cs typeface="Tahoma" panose="020B0604030504040204" pitchFamily="34" charset="0"/>
+              </a:rPr>
+              <a:t> </a:t>
+            </a:r>
+            <a:r>
+              <a:rPr lang="en-US" sz="2000" dirty="0" err="1" smtClean="0">
+                <a:solidFill>
+                  <a:srgbClr val="0070C0"/>
+                </a:solidFill>
+                <a:latin typeface="Tahoma" panose="020B0604030504040204" pitchFamily="34" charset="0"/>
+                <a:cs typeface="Tahoma" panose="020B0604030504040204" pitchFamily="34" charset="0"/>
+              </a:rPr>
+              <a:t>thực</a:t>
+            </a:r>
+            <a:r>
+              <a:rPr lang="en-US" sz="2000" dirty="0" smtClean="0">
+                <a:solidFill>
+                  <a:srgbClr val="0070C0"/>
+                </a:solidFill>
+                <a:latin typeface="Tahoma" panose="020B0604030504040204" pitchFamily="34" charset="0"/>
+                <a:cs typeface="Tahoma" panose="020B0604030504040204" pitchFamily="34" charset="0"/>
+              </a:rPr>
+              <a:t> </a:t>
+            </a:r>
+            <a:r>
+              <a:rPr lang="en-US" sz="2000" dirty="0" err="1" smtClean="0">
+                <a:solidFill>
+                  <a:srgbClr val="0070C0"/>
+                </a:solidFill>
+                <a:latin typeface="Tahoma" panose="020B0604030504040204" pitchFamily="34" charset="0"/>
+                <a:cs typeface="Tahoma" panose="020B0604030504040204" pitchFamily="34" charset="0"/>
+              </a:rPr>
+              <a:t>thi</a:t>
+            </a:r>
+            <a:r>
+              <a:rPr lang="en-US" sz="2000" dirty="0" smtClean="0">
+                <a:solidFill>
+                  <a:srgbClr val="0070C0"/>
+                </a:solidFill>
+                <a:latin typeface="Tahoma" panose="020B0604030504040204" pitchFamily="34" charset="0"/>
+                <a:cs typeface="Tahoma" panose="020B0604030504040204" pitchFamily="34" charset="0"/>
+              </a:rPr>
+              <a:t> </a:t>
+            </a:r>
+            <a:r>
+              <a:rPr lang="en-US" sz="2000" dirty="0" err="1" smtClean="0">
+                <a:solidFill>
+                  <a:srgbClr val="0070C0"/>
+                </a:solidFill>
+                <a:latin typeface="Tahoma" panose="020B0604030504040204" pitchFamily="34" charset="0"/>
+                <a:cs typeface="Tahoma" panose="020B0604030504040204" pitchFamily="34" charset="0"/>
+              </a:rPr>
+              <a:t>sẽ</a:t>
+            </a:r>
+            <a:r>
+              <a:rPr lang="en-US" sz="2000" dirty="0" smtClean="0">
+                <a:solidFill>
+                  <a:srgbClr val="0070C0"/>
+                </a:solidFill>
+                <a:latin typeface="Tahoma" panose="020B0604030504040204" pitchFamily="34" charset="0"/>
+                <a:cs typeface="Tahoma" panose="020B0604030504040204" pitchFamily="34" charset="0"/>
+              </a:rPr>
+              <a:t> </a:t>
+            </a:r>
+            <a:r>
+              <a:rPr lang="en-US" sz="2000" dirty="0" err="1" smtClean="0">
+                <a:solidFill>
+                  <a:srgbClr val="0070C0"/>
+                </a:solidFill>
+                <a:latin typeface="Tahoma" panose="020B0604030504040204" pitchFamily="34" charset="0"/>
+                <a:cs typeface="Tahoma" panose="020B0604030504040204" pitchFamily="34" charset="0"/>
+              </a:rPr>
+              <a:t>là</a:t>
+            </a:r>
+            <a:r>
+              <a:rPr lang="en-US" sz="2000" dirty="0">
+                <a:solidFill>
+                  <a:srgbClr val="0070C0"/>
+                </a:solidFill>
+                <a:latin typeface="Tahoma" panose="020B0604030504040204" pitchFamily="34" charset="0"/>
+                <a:cs typeface="Tahoma" panose="020B0604030504040204" pitchFamily="34" charset="0"/>
+              </a:rPr>
+              <a:t> factorial(0) </a:t>
+            </a:r>
+            <a:r>
+              <a:rPr lang="en-US" sz="2000" dirty="0" smtClean="0">
+                <a:solidFill>
+                  <a:srgbClr val="0070C0"/>
+                </a:solidFill>
+                <a:latin typeface="Tahoma" panose="020B0604030504040204" pitchFamily="34" charset="0"/>
+                <a:cs typeface="Tahoma" panose="020B0604030504040204" pitchFamily="34" charset="0"/>
+              </a:rPr>
+              <a:t>, factorial(1) , … ,factorial(n) .</a:t>
+            </a:r>
+            <a:endParaRPr lang="en-US" sz="2000" dirty="0">
+              <a:solidFill>
+                <a:srgbClr val="0070C0"/>
+              </a:solidFill>
+              <a:latin typeface="Tahoma" panose="020B0604030504040204" pitchFamily="34" charset="0"/>
+              <a:cs typeface="Tahoma" panose="020B0604030504040204" pitchFamily="34" charset="0"/>
+            </a:endParaRPr>
+          </a:p>
+        </p:txBody>
+      </p:sp>
+    </p:spTree>
+    <p:extLst>
+      <p:ext uri="{BB962C8B-B14F-4D97-AF65-F5344CB8AC3E}">
+        <p14:creationId xmlns:p14="http://schemas.microsoft.com/office/powerpoint/2010/main" val="767091856"/>
+      </p:ext>
+    </p:extLst>
+  </p:cSld>
+  <p:clrMapOvr>
+    <a:masterClrMapping/>
+  </p:clrMapOvr>
+</p:sld>
+</file>
+
+<file path=ppt/slides/slide5.xml><?xml version="1.0" encoding="utf-8"?>
+<p:sld xmlns:a="http://schemas.openxmlformats.org/drawingml/2006/main" xmlns:r="http://schemas.openxmlformats.org/officeDocument/2006/relationships" xmlns:p="http://schemas.openxmlformats.org/presentationml/2006/main">
+  <p:cSld>
+    <p:spTree>
+      <p:nvGrpSpPr>
+        <p:cNvPr id="1" name=""/>
+        <p:cNvGrpSpPr/>
+        <p:nvPr/>
+      </p:nvGrpSpPr>
+      <p:grpSpPr>
+        <a:xfrm>
+          <a:off x="0" y="0"/>
+          <a:ext cx="0" cy="0"/>
+          <a:chOff x="0" y="0"/>
+          <a:chExt cx="0" cy="0"/>
+        </a:xfrm>
+      </p:grpSpPr>
+      <p:sp>
+        <p:nvSpPr>
+          <p:cNvPr id="4" name="Slide Number Placeholder 3"/>
+          <p:cNvSpPr>
+            <a:spLocks noGrp="1"/>
+          </p:cNvSpPr>
+          <p:nvPr>
+            <p:ph type="sldNum" sz="quarter" idx="12"/>
+          </p:nvPr>
+        </p:nvSpPr>
+        <p:spPr/>
+        <p:txBody>
+          <a:bodyPr/>
+          <a:lstStyle/>
+          <a:p>
+            <a:fld id="{D57F1E4F-1CFF-5643-939E-217C01CDF565}" type="slidenum">
+              <a:rPr lang="en-US" smtClean="0"/>
+              <a:pPr/>
+              <a:t>5</a:t>
+            </a:fld>
+            <a:endParaRPr lang="en-US" dirty="0"/>
+          </a:p>
+        </p:txBody>
+      </p:sp>
+      <p:sp>
+        <p:nvSpPr>
+          <p:cNvPr id="6" name="TextBox 5"/>
+          <p:cNvSpPr txBox="1"/>
+          <p:nvPr/>
+        </p:nvSpPr>
+        <p:spPr>
+          <a:xfrm>
+            <a:off x="2855344" y="418450"/>
+            <a:ext cx="8246853" cy="707886"/>
+          </a:xfrm>
+          <a:prstGeom prst="rect">
+            <a:avLst/>
+          </a:prstGeom>
+          <a:noFill/>
+        </p:spPr>
+        <p:txBody>
+          <a:bodyPr wrap="square" rtlCol="0">
+            <a:spAutoFit/>
+          </a:bodyPr>
+          <a:lstStyle/>
+          <a:p>
+            <a:r>
+              <a:rPr lang="en-US" sz="2000" dirty="0" smtClean="0">
+                <a:solidFill>
+                  <a:srgbClr val="0070C0"/>
+                </a:solidFill>
+                <a:latin typeface="Tahoma" panose="020B0604030504040204" pitchFamily="34" charset="0"/>
+                <a:cs typeface="Tahoma" panose="020B0604030504040204" pitchFamily="34" charset="0"/>
+              </a:rPr>
+              <a:t>Fallback </a:t>
+            </a:r>
+            <a:r>
+              <a:rPr lang="en-US" sz="2000" dirty="0" err="1" smtClean="0">
+                <a:solidFill>
+                  <a:srgbClr val="0070C0"/>
+                </a:solidFill>
+                <a:latin typeface="Tahoma" panose="020B0604030504040204" pitchFamily="34" charset="0"/>
+                <a:cs typeface="Tahoma" panose="020B0604030504040204" pitchFamily="34" charset="0"/>
+              </a:rPr>
+              <a:t>trong</a:t>
+            </a:r>
+            <a:r>
+              <a:rPr lang="en-US" sz="2000" dirty="0" smtClean="0">
+                <a:solidFill>
+                  <a:srgbClr val="0070C0"/>
+                </a:solidFill>
+                <a:latin typeface="Tahoma" panose="020B0604030504040204" pitchFamily="34" charset="0"/>
+                <a:cs typeface="Tahoma" panose="020B0604030504040204" pitchFamily="34" charset="0"/>
+              </a:rPr>
+              <a:t> </a:t>
+            </a:r>
+            <a:r>
+              <a:rPr lang="en-US" sz="2000" dirty="0" err="1" smtClean="0">
+                <a:solidFill>
+                  <a:srgbClr val="0070C0"/>
+                </a:solidFill>
+                <a:latin typeface="Tahoma" panose="020B0604030504040204" pitchFamily="34" charset="0"/>
+                <a:cs typeface="Tahoma" panose="020B0604030504040204" pitchFamily="34" charset="0"/>
+              </a:rPr>
+              <a:t>Recusion</a:t>
+            </a:r>
+            <a:r>
+              <a:rPr lang="en-US" sz="2000" dirty="0" smtClean="0">
+                <a:solidFill>
+                  <a:srgbClr val="0070C0"/>
+                </a:solidFill>
+                <a:latin typeface="Tahoma" panose="020B0604030504040204" pitchFamily="34" charset="0"/>
+                <a:cs typeface="Tahoma" panose="020B0604030504040204" pitchFamily="34" charset="0"/>
+              </a:rPr>
+              <a:t> : </a:t>
+            </a:r>
             <a:endParaRPr lang="en-US" sz="2000" dirty="0" smtClean="0">
               <a:solidFill>
                 <a:srgbClr val="0070C0"/>
@@ -9894,71 +10192,6 @@
             </a:endParaRPr>
           </a:p>
           <a:p>
-            <a:pPr>
-              <a:lnSpc>
-                <a:spcPct val="200000"/>
-              </a:lnSpc>
-            </a:pPr>
-            <a:r>
-              <a:rPr lang="en-US" sz="2000" dirty="0" err="1" smtClean="0">
-                <a:solidFill>
-                  <a:srgbClr val="0070C0"/>
-                </a:solidFill>
-                <a:latin typeface="Tahoma" panose="020B0604030504040204" pitchFamily="34" charset="0"/>
-                <a:cs typeface="Tahoma" panose="020B0604030504040204" pitchFamily="34" charset="0"/>
-              </a:rPr>
-              <a:t>Và</a:t>
-            </a:r>
-            <a:r>
-              <a:rPr lang="en-US" sz="2000" dirty="0" smtClean="0">
-                <a:solidFill>
-                  <a:srgbClr val="0070C0"/>
-                </a:solidFill>
-                <a:latin typeface="Tahoma" panose="020B0604030504040204" pitchFamily="34" charset="0"/>
-                <a:cs typeface="Tahoma" panose="020B0604030504040204" pitchFamily="34" charset="0"/>
-              </a:rPr>
-              <a:t> </a:t>
-            </a:r>
-            <a:r>
-              <a:rPr lang="en-US" sz="2000" dirty="0" err="1" smtClean="0">
-                <a:solidFill>
-                  <a:srgbClr val="0070C0"/>
-                </a:solidFill>
-                <a:latin typeface="Tahoma" panose="020B0604030504040204" pitchFamily="34" charset="0"/>
-                <a:cs typeface="Tahoma" panose="020B0604030504040204" pitchFamily="34" charset="0"/>
-              </a:rPr>
-              <a:t>thứ</a:t>
-            </a:r>
-            <a:r>
-              <a:rPr lang="en-US" sz="2000" dirty="0" smtClean="0">
-                <a:solidFill>
-                  <a:srgbClr val="0070C0"/>
-                </a:solidFill>
-                <a:latin typeface="Tahoma" panose="020B0604030504040204" pitchFamily="34" charset="0"/>
-                <a:cs typeface="Tahoma" panose="020B0604030504040204" pitchFamily="34" charset="0"/>
-              </a:rPr>
-              <a:t> </a:t>
-            </a:r>
-            <a:r>
-              <a:rPr lang="en-US" sz="2000" dirty="0" err="1" smtClean="0">
-                <a:solidFill>
-                  <a:srgbClr val="0070C0"/>
-                </a:solidFill>
-                <a:latin typeface="Tahoma" panose="020B0604030504040204" pitchFamily="34" charset="0"/>
-                <a:cs typeface="Tahoma" panose="020B0604030504040204" pitchFamily="34" charset="0"/>
-              </a:rPr>
-              <a:t>tự</a:t>
-            </a:r>
-            <a:r>
-              <a:rPr lang="en-US" sz="2000" dirty="0" smtClean="0">
-                <a:solidFill>
-                  <a:srgbClr val="0070C0"/>
-                </a:solidFill>
-                <a:latin typeface="Tahoma" panose="020B0604030504040204" pitchFamily="34" charset="0"/>
-                <a:cs typeface="Tahoma" panose="020B0604030504040204" pitchFamily="34" charset="0"/>
-              </a:rPr>
-              <a:t> </a:t>
-            </a:r>
             <a:endParaRPr lang="en-US" sz="2000" dirty="0">
               <a:solidFill>
                 <a:srgbClr val="0070C0"/>
@@ -9969,10 +10202,3475 @@
           </a:p>
         </p:txBody>
       </p:sp>
+      <p:sp>
+        <p:nvSpPr>
+          <p:cNvPr id="7" name="TextBox 6"/>
+          <p:cNvSpPr txBox="1"/>
+          <p:nvPr/>
+        </p:nvSpPr>
+        <p:spPr>
+          <a:xfrm>
+            <a:off x="2697193" y="3529710"/>
+            <a:ext cx="8413630" cy="2554545"/>
+          </a:xfrm>
+          <a:prstGeom prst="rect">
+            <a:avLst/>
+          </a:prstGeom>
+          <a:noFill/>
+        </p:spPr>
+        <p:txBody>
+          <a:bodyPr wrap="square" rtlCol="0">
+            <a:spAutoFit/>
+          </a:bodyPr>
+          <a:lstStyle/>
+          <a:p>
+            <a:pPr>
+              <a:lnSpc>
+                <a:spcPct val="200000"/>
+              </a:lnSpc>
+            </a:pPr>
+            <a:r>
+              <a:rPr lang="en-US" sz="2000" dirty="0" err="1" smtClean="0">
+                <a:solidFill>
+                  <a:srgbClr val="0070C0"/>
+                </a:solidFill>
+                <a:latin typeface="Tahoma" panose="020B0604030504040204" pitchFamily="34" charset="0"/>
+                <a:cs typeface="Tahoma" panose="020B0604030504040204" pitchFamily="34" charset="0"/>
+              </a:rPr>
+              <a:t>FallBack</a:t>
+            </a:r>
+            <a:r>
+              <a:rPr lang="en-US" sz="2000" dirty="0" smtClean="0">
+                <a:solidFill>
+                  <a:srgbClr val="0070C0"/>
+                </a:solidFill>
+                <a:latin typeface="Tahoma" panose="020B0604030504040204" pitchFamily="34" charset="0"/>
+                <a:cs typeface="Tahoma" panose="020B0604030504040204" pitchFamily="34" charset="0"/>
+              </a:rPr>
+              <a:t> </a:t>
+            </a:r>
+            <a:r>
+              <a:rPr lang="en-US" sz="2000" dirty="0" err="1" smtClean="0">
+                <a:solidFill>
+                  <a:srgbClr val="0070C0"/>
+                </a:solidFill>
+                <a:latin typeface="Tahoma" panose="020B0604030504040204" pitchFamily="34" charset="0"/>
+                <a:cs typeface="Tahoma" panose="020B0604030504040204" pitchFamily="34" charset="0"/>
+              </a:rPr>
+              <a:t>là</a:t>
+            </a:r>
+            <a:r>
+              <a:rPr lang="en-US" sz="2000" dirty="0" smtClean="0">
+                <a:solidFill>
+                  <a:srgbClr val="0070C0"/>
+                </a:solidFill>
+                <a:latin typeface="Tahoma" panose="020B0604030504040204" pitchFamily="34" charset="0"/>
+                <a:cs typeface="Tahoma" panose="020B0604030504040204" pitchFamily="34" charset="0"/>
+              </a:rPr>
+              <a:t> </a:t>
+            </a:r>
+            <a:r>
+              <a:rPr lang="en-US" sz="2000" dirty="0" err="1" smtClean="0">
+                <a:solidFill>
+                  <a:srgbClr val="0070C0"/>
+                </a:solidFill>
+                <a:latin typeface="Tahoma" panose="020B0604030504040204" pitchFamily="34" charset="0"/>
+                <a:cs typeface="Tahoma" panose="020B0604030504040204" pitchFamily="34" charset="0"/>
+              </a:rPr>
+              <a:t>kiểu</a:t>
+            </a:r>
+            <a:r>
+              <a:rPr lang="en-US" sz="2000" dirty="0" smtClean="0">
+                <a:solidFill>
+                  <a:srgbClr val="0070C0"/>
+                </a:solidFill>
+                <a:latin typeface="Tahoma" panose="020B0604030504040204" pitchFamily="34" charset="0"/>
+                <a:cs typeface="Tahoma" panose="020B0604030504040204" pitchFamily="34" charset="0"/>
+              </a:rPr>
+              <a:t> </a:t>
+            </a:r>
+            <a:r>
+              <a:rPr lang="en-US" sz="2000" dirty="0" err="1" smtClean="0">
+                <a:solidFill>
+                  <a:srgbClr val="0070C0"/>
+                </a:solidFill>
+                <a:latin typeface="Tahoma" panose="020B0604030504040204" pitchFamily="34" charset="0"/>
+                <a:cs typeface="Tahoma" panose="020B0604030504040204" pitchFamily="34" charset="0"/>
+              </a:rPr>
+              <a:t>viết</a:t>
+            </a:r>
+            <a:r>
+              <a:rPr lang="en-US" sz="2000" dirty="0" smtClean="0">
+                <a:solidFill>
+                  <a:srgbClr val="0070C0"/>
+                </a:solidFill>
+                <a:latin typeface="Tahoma" panose="020B0604030504040204" pitchFamily="34" charset="0"/>
+                <a:cs typeface="Tahoma" panose="020B0604030504040204" pitchFamily="34" charset="0"/>
+              </a:rPr>
+              <a:t> code </a:t>
+            </a:r>
+            <a:r>
+              <a:rPr lang="en-US" sz="2000" dirty="0" err="1" smtClean="0">
+                <a:solidFill>
+                  <a:srgbClr val="0070C0"/>
+                </a:solidFill>
+                <a:latin typeface="Tahoma" panose="020B0604030504040204" pitchFamily="34" charset="0"/>
+                <a:cs typeface="Tahoma" panose="020B0604030504040204" pitchFamily="34" charset="0"/>
+              </a:rPr>
+              <a:t>mà</a:t>
+            </a:r>
+            <a:r>
+              <a:rPr lang="en-US" sz="2000" dirty="0" smtClean="0">
+                <a:solidFill>
+                  <a:srgbClr val="0070C0"/>
+                </a:solidFill>
+                <a:latin typeface="Tahoma" panose="020B0604030504040204" pitchFamily="34" charset="0"/>
+                <a:cs typeface="Tahoma" panose="020B0604030504040204" pitchFamily="34" charset="0"/>
+              </a:rPr>
+              <a:t> ta </a:t>
+            </a:r>
+            <a:r>
+              <a:rPr lang="en-US" sz="2000" dirty="0" err="1" smtClean="0">
+                <a:solidFill>
+                  <a:srgbClr val="0070C0"/>
+                </a:solidFill>
+                <a:latin typeface="Tahoma" panose="020B0604030504040204" pitchFamily="34" charset="0"/>
+                <a:cs typeface="Tahoma" panose="020B0604030504040204" pitchFamily="34" charset="0"/>
+              </a:rPr>
+              <a:t>ko</a:t>
+            </a:r>
+            <a:r>
+              <a:rPr lang="en-US" sz="2000" dirty="0" smtClean="0">
+                <a:solidFill>
+                  <a:srgbClr val="0070C0"/>
+                </a:solidFill>
+                <a:latin typeface="Tahoma" panose="020B0604030504040204" pitchFamily="34" charset="0"/>
+                <a:cs typeface="Tahoma" panose="020B0604030504040204" pitchFamily="34" charset="0"/>
+              </a:rPr>
+              <a:t> </a:t>
+            </a:r>
+            <a:r>
+              <a:rPr lang="en-US" sz="2000" dirty="0" err="1" smtClean="0">
+                <a:solidFill>
+                  <a:srgbClr val="0070C0"/>
+                </a:solidFill>
+                <a:latin typeface="Tahoma" panose="020B0604030504040204" pitchFamily="34" charset="0"/>
+                <a:cs typeface="Tahoma" panose="020B0604030504040204" pitchFamily="34" charset="0"/>
+              </a:rPr>
+              <a:t>cần</a:t>
+            </a:r>
+            <a:r>
+              <a:rPr lang="en-US" sz="2000" dirty="0" smtClean="0">
+                <a:solidFill>
+                  <a:srgbClr val="0070C0"/>
+                </a:solidFill>
+                <a:latin typeface="Tahoma" panose="020B0604030504040204" pitchFamily="34" charset="0"/>
+                <a:cs typeface="Tahoma" panose="020B0604030504040204" pitchFamily="34" charset="0"/>
+              </a:rPr>
+              <a:t> </a:t>
+            </a:r>
+            <a:r>
+              <a:rPr lang="en-US" sz="2000" dirty="0" err="1" smtClean="0">
+                <a:solidFill>
+                  <a:srgbClr val="0070C0"/>
+                </a:solidFill>
+                <a:latin typeface="Tahoma" panose="020B0604030504040204" pitchFamily="34" charset="0"/>
+                <a:cs typeface="Tahoma" panose="020B0604030504040204" pitchFamily="34" charset="0"/>
+              </a:rPr>
+              <a:t>dùng</a:t>
+            </a:r>
+            <a:r>
+              <a:rPr lang="en-US" sz="2000" dirty="0" smtClean="0">
+                <a:solidFill>
+                  <a:srgbClr val="0070C0"/>
+                </a:solidFill>
+                <a:latin typeface="Tahoma" panose="020B0604030504040204" pitchFamily="34" charset="0"/>
+                <a:cs typeface="Tahoma" panose="020B0604030504040204" pitchFamily="34" charset="0"/>
+              </a:rPr>
+              <a:t> if else </a:t>
+            </a:r>
+            <a:r>
+              <a:rPr lang="en-US" sz="2000" dirty="0" err="1" smtClean="0">
+                <a:solidFill>
+                  <a:srgbClr val="0070C0"/>
+                </a:solidFill>
+                <a:latin typeface="Tahoma" panose="020B0604030504040204" pitchFamily="34" charset="0"/>
+                <a:cs typeface="Tahoma" panose="020B0604030504040204" pitchFamily="34" charset="0"/>
+              </a:rPr>
+              <a:t>nhưng</a:t>
+            </a:r>
+            <a:r>
+              <a:rPr lang="en-US" sz="2000" dirty="0" smtClean="0">
+                <a:solidFill>
+                  <a:srgbClr val="0070C0"/>
+                </a:solidFill>
+                <a:latin typeface="Tahoma" panose="020B0604030504040204" pitchFamily="34" charset="0"/>
+                <a:cs typeface="Tahoma" panose="020B0604030504040204" pitchFamily="34" charset="0"/>
+              </a:rPr>
+              <a:t> </a:t>
+            </a:r>
+            <a:r>
+              <a:rPr lang="en-US" sz="2000" dirty="0" err="1" smtClean="0">
+                <a:solidFill>
+                  <a:srgbClr val="0070C0"/>
+                </a:solidFill>
+                <a:latin typeface="Tahoma" panose="020B0604030504040204" pitchFamily="34" charset="0"/>
+                <a:cs typeface="Tahoma" panose="020B0604030504040204" pitchFamily="34" charset="0"/>
+              </a:rPr>
+              <a:t>vẫn</a:t>
+            </a:r>
+            <a:r>
+              <a:rPr lang="en-US" sz="2000" dirty="0" smtClean="0">
+                <a:solidFill>
+                  <a:srgbClr val="0070C0"/>
+                </a:solidFill>
+                <a:latin typeface="Tahoma" panose="020B0604030504040204" pitchFamily="34" charset="0"/>
+                <a:cs typeface="Tahoma" panose="020B0604030504040204" pitchFamily="34" charset="0"/>
+              </a:rPr>
+              <a:t> </a:t>
+            </a:r>
+            <a:r>
+              <a:rPr lang="en-US" sz="2000" dirty="0" err="1" smtClean="0">
+                <a:solidFill>
+                  <a:srgbClr val="0070C0"/>
+                </a:solidFill>
+                <a:latin typeface="Tahoma" panose="020B0604030504040204" pitchFamily="34" charset="0"/>
+                <a:cs typeface="Tahoma" panose="020B0604030504040204" pitchFamily="34" charset="0"/>
+              </a:rPr>
+              <a:t>trả</a:t>
+            </a:r>
+            <a:r>
+              <a:rPr lang="en-US" sz="2000" dirty="0" smtClean="0">
+                <a:solidFill>
+                  <a:srgbClr val="0070C0"/>
+                </a:solidFill>
+                <a:latin typeface="Tahoma" panose="020B0604030504040204" pitchFamily="34" charset="0"/>
+                <a:cs typeface="Tahoma" panose="020B0604030504040204" pitchFamily="34" charset="0"/>
+              </a:rPr>
+              <a:t> </a:t>
+            </a:r>
+            <a:r>
+              <a:rPr lang="en-US" sz="2000" dirty="0" err="1" smtClean="0">
+                <a:solidFill>
+                  <a:srgbClr val="0070C0"/>
+                </a:solidFill>
+                <a:latin typeface="Tahoma" panose="020B0604030504040204" pitchFamily="34" charset="0"/>
+                <a:cs typeface="Tahoma" panose="020B0604030504040204" pitchFamily="34" charset="0"/>
+              </a:rPr>
+              <a:t>về</a:t>
+            </a:r>
+            <a:r>
+              <a:rPr lang="en-US" sz="2000" dirty="0" smtClean="0">
+                <a:solidFill>
+                  <a:srgbClr val="0070C0"/>
+                </a:solidFill>
+                <a:latin typeface="Tahoma" panose="020B0604030504040204" pitchFamily="34" charset="0"/>
+                <a:cs typeface="Tahoma" panose="020B0604030504040204" pitchFamily="34" charset="0"/>
+              </a:rPr>
+              <a:t> </a:t>
+            </a:r>
+            <a:r>
+              <a:rPr lang="en-US" sz="2000" dirty="0" err="1" smtClean="0">
+                <a:solidFill>
+                  <a:srgbClr val="0070C0"/>
+                </a:solidFill>
+                <a:latin typeface="Tahoma" panose="020B0604030504040204" pitchFamily="34" charset="0"/>
+                <a:cs typeface="Tahoma" panose="020B0604030504040204" pitchFamily="34" charset="0"/>
+              </a:rPr>
+              <a:t>kết</a:t>
+            </a:r>
+            <a:endParaRPr lang="en-US" sz="2000" dirty="0" smtClean="0">
+              <a:solidFill>
+                <a:srgbClr val="0070C0"/>
+              </a:solidFill>
+              <a:latin typeface="Tahoma" panose="020B0604030504040204" pitchFamily="34" charset="0"/>
+              <a:cs typeface="Tahoma" panose="020B0604030504040204" pitchFamily="34" charset="0"/>
+            </a:endParaRPr>
+          </a:p>
+          <a:p>
+            <a:pPr>
+              <a:lnSpc>
+                <a:spcPct val="200000"/>
+              </a:lnSpc>
+            </a:pPr>
+            <a:r>
+              <a:rPr lang="en-US" sz="2000" dirty="0" err="1" smtClean="0">
+                <a:solidFill>
+                  <a:srgbClr val="0070C0"/>
+                </a:solidFill>
+                <a:latin typeface="Tahoma" panose="020B0604030504040204" pitchFamily="34" charset="0"/>
+                <a:cs typeface="Tahoma" panose="020B0604030504040204" pitchFamily="34" charset="0"/>
+              </a:rPr>
+              <a:t>quả</a:t>
+            </a:r>
+            <a:r>
+              <a:rPr lang="en-US" sz="2000" dirty="0" smtClean="0">
+                <a:solidFill>
+                  <a:srgbClr val="0070C0"/>
+                </a:solidFill>
+                <a:latin typeface="Tahoma" panose="020B0604030504040204" pitchFamily="34" charset="0"/>
+                <a:cs typeface="Tahoma" panose="020B0604030504040204" pitchFamily="34" charset="0"/>
+              </a:rPr>
+              <a:t> </a:t>
+            </a:r>
+            <a:r>
+              <a:rPr lang="en-US" sz="2000" dirty="0" err="1" smtClean="0">
+                <a:solidFill>
+                  <a:srgbClr val="0070C0"/>
+                </a:solidFill>
+                <a:latin typeface="Tahoma" panose="020B0604030504040204" pitchFamily="34" charset="0"/>
+                <a:cs typeface="Tahoma" panose="020B0604030504040204" pitchFamily="34" charset="0"/>
+              </a:rPr>
+              <a:t>mong</a:t>
+            </a:r>
+            <a:r>
+              <a:rPr lang="en-US" sz="2000" dirty="0" smtClean="0">
+                <a:solidFill>
+                  <a:srgbClr val="0070C0"/>
+                </a:solidFill>
+                <a:latin typeface="Tahoma" panose="020B0604030504040204" pitchFamily="34" charset="0"/>
+                <a:cs typeface="Tahoma" panose="020B0604030504040204" pitchFamily="34" charset="0"/>
+              </a:rPr>
+              <a:t> </a:t>
+            </a:r>
+            <a:r>
+              <a:rPr lang="en-US" sz="2000" dirty="0" err="1" smtClean="0">
+                <a:solidFill>
+                  <a:srgbClr val="0070C0"/>
+                </a:solidFill>
+                <a:latin typeface="Tahoma" panose="020B0604030504040204" pitchFamily="34" charset="0"/>
+                <a:cs typeface="Tahoma" panose="020B0604030504040204" pitchFamily="34" charset="0"/>
+              </a:rPr>
+              <a:t>muốn</a:t>
+            </a:r>
+            <a:r>
+              <a:rPr lang="en-US" sz="2000" dirty="0" smtClean="0">
+                <a:solidFill>
+                  <a:srgbClr val="0070C0"/>
+                </a:solidFill>
+                <a:latin typeface="Tahoma" panose="020B0604030504040204" pitchFamily="34" charset="0"/>
+                <a:cs typeface="Tahoma" panose="020B0604030504040204" pitchFamily="34" charset="0"/>
+              </a:rPr>
+              <a:t>.</a:t>
+            </a:r>
+          </a:p>
+          <a:p>
+            <a:pPr>
+              <a:lnSpc>
+                <a:spcPct val="200000"/>
+              </a:lnSpc>
+            </a:pPr>
+            <a:r>
+              <a:rPr lang="en-US" sz="2000" dirty="0" err="1" smtClean="0">
+                <a:solidFill>
+                  <a:srgbClr val="0070C0"/>
+                </a:solidFill>
+                <a:latin typeface="Tahoma" panose="020B0604030504040204" pitchFamily="34" charset="0"/>
+                <a:cs typeface="Tahoma" panose="020B0604030504040204" pitchFamily="34" charset="0"/>
+              </a:rPr>
+              <a:t>Trong</a:t>
+            </a:r>
+            <a:r>
+              <a:rPr lang="en-US" sz="2000" dirty="0" smtClean="0">
+                <a:solidFill>
+                  <a:srgbClr val="0070C0"/>
+                </a:solidFill>
+                <a:latin typeface="Tahoma" panose="020B0604030504040204" pitchFamily="34" charset="0"/>
+                <a:cs typeface="Tahoma" panose="020B0604030504040204" pitchFamily="34" charset="0"/>
+              </a:rPr>
+              <a:t> </a:t>
+            </a:r>
+            <a:r>
+              <a:rPr lang="en-US" sz="2000" dirty="0" err="1" smtClean="0">
+                <a:solidFill>
+                  <a:srgbClr val="0070C0"/>
+                </a:solidFill>
+                <a:latin typeface="Tahoma" panose="020B0604030504040204" pitchFamily="34" charset="0"/>
+                <a:cs typeface="Tahoma" panose="020B0604030504040204" pitchFamily="34" charset="0"/>
+              </a:rPr>
+              <a:t>đệ</a:t>
+            </a:r>
+            <a:r>
+              <a:rPr lang="en-US" sz="2000" dirty="0" smtClean="0">
+                <a:solidFill>
+                  <a:srgbClr val="0070C0"/>
+                </a:solidFill>
+                <a:latin typeface="Tahoma" panose="020B0604030504040204" pitchFamily="34" charset="0"/>
+                <a:cs typeface="Tahoma" panose="020B0604030504040204" pitchFamily="34" charset="0"/>
+              </a:rPr>
+              <a:t> </a:t>
+            </a:r>
+            <a:r>
+              <a:rPr lang="en-US" sz="2000" dirty="0" err="1" smtClean="0">
+                <a:solidFill>
+                  <a:srgbClr val="0070C0"/>
+                </a:solidFill>
+                <a:latin typeface="Tahoma" panose="020B0604030504040204" pitchFamily="34" charset="0"/>
+                <a:cs typeface="Tahoma" panose="020B0604030504040204" pitchFamily="34" charset="0"/>
+              </a:rPr>
+              <a:t>quy</a:t>
+            </a:r>
+            <a:r>
+              <a:rPr lang="en-US" sz="2000" dirty="0" smtClean="0">
+                <a:solidFill>
+                  <a:srgbClr val="0070C0"/>
+                </a:solidFill>
+                <a:latin typeface="Tahoma" panose="020B0604030504040204" pitchFamily="34" charset="0"/>
+                <a:cs typeface="Tahoma" panose="020B0604030504040204" pitchFamily="34" charset="0"/>
+              </a:rPr>
+              <a:t> </a:t>
+            </a:r>
+            <a:r>
+              <a:rPr lang="en-US" sz="2000" dirty="0" err="1" smtClean="0">
+                <a:solidFill>
+                  <a:srgbClr val="0070C0"/>
+                </a:solidFill>
+                <a:latin typeface="Tahoma" panose="020B0604030504040204" pitchFamily="34" charset="0"/>
+                <a:cs typeface="Tahoma" panose="020B0604030504040204" pitchFamily="34" charset="0"/>
+              </a:rPr>
+              <a:t>FalBack</a:t>
+            </a:r>
+            <a:r>
+              <a:rPr lang="en-US" sz="2000" dirty="0" smtClean="0">
+                <a:solidFill>
+                  <a:srgbClr val="0070C0"/>
+                </a:solidFill>
+                <a:latin typeface="Tahoma" panose="020B0604030504040204" pitchFamily="34" charset="0"/>
+                <a:cs typeface="Tahoma" panose="020B0604030504040204" pitchFamily="34" charset="0"/>
+              </a:rPr>
+              <a:t> </a:t>
+            </a:r>
+            <a:r>
+              <a:rPr lang="en-US" sz="2000" dirty="0" err="1" smtClean="0">
+                <a:solidFill>
+                  <a:srgbClr val="0070C0"/>
+                </a:solidFill>
+                <a:latin typeface="Tahoma" panose="020B0604030504040204" pitchFamily="34" charset="0"/>
+                <a:cs typeface="Tahoma" panose="020B0604030504040204" pitchFamily="34" charset="0"/>
+              </a:rPr>
+              <a:t>được</a:t>
+            </a:r>
+            <a:r>
+              <a:rPr lang="en-US" sz="2000" dirty="0" smtClean="0">
+                <a:solidFill>
+                  <a:srgbClr val="0070C0"/>
+                </a:solidFill>
+                <a:latin typeface="Tahoma" panose="020B0604030504040204" pitchFamily="34" charset="0"/>
+                <a:cs typeface="Tahoma" panose="020B0604030504040204" pitchFamily="34" charset="0"/>
+              </a:rPr>
+              <a:t> dung </a:t>
+            </a:r>
+            <a:r>
+              <a:rPr lang="en-US" sz="2000" dirty="0" err="1" smtClean="0">
+                <a:solidFill>
+                  <a:srgbClr val="0070C0"/>
+                </a:solidFill>
+                <a:latin typeface="Tahoma" panose="020B0604030504040204" pitchFamily="34" charset="0"/>
+                <a:cs typeface="Tahoma" panose="020B0604030504040204" pitchFamily="34" charset="0"/>
+              </a:rPr>
+              <a:t>để</a:t>
+            </a:r>
+            <a:r>
+              <a:rPr lang="en-US" sz="2000" dirty="0" smtClean="0">
+                <a:solidFill>
+                  <a:srgbClr val="0070C0"/>
+                </a:solidFill>
+                <a:latin typeface="Tahoma" panose="020B0604030504040204" pitchFamily="34" charset="0"/>
+                <a:cs typeface="Tahoma" panose="020B0604030504040204" pitchFamily="34" charset="0"/>
+              </a:rPr>
+              <a:t> </a:t>
+            </a:r>
+            <a:r>
+              <a:rPr lang="en-US" sz="2000" dirty="0" err="1" smtClean="0">
+                <a:solidFill>
+                  <a:srgbClr val="0070C0"/>
+                </a:solidFill>
+                <a:latin typeface="Tahoma" panose="020B0604030504040204" pitchFamily="34" charset="0"/>
+                <a:cs typeface="Tahoma" panose="020B0604030504040204" pitchFamily="34" charset="0"/>
+              </a:rPr>
+              <a:t>chuyển</a:t>
+            </a:r>
+            <a:r>
+              <a:rPr lang="en-US" sz="2000" dirty="0" smtClean="0">
+                <a:solidFill>
+                  <a:srgbClr val="0070C0"/>
+                </a:solidFill>
+                <a:latin typeface="Tahoma" panose="020B0604030504040204" pitchFamily="34" charset="0"/>
+                <a:cs typeface="Tahoma" panose="020B0604030504040204" pitchFamily="34" charset="0"/>
+              </a:rPr>
+              <a:t> </a:t>
+            </a:r>
+            <a:r>
+              <a:rPr lang="en-US" sz="2000" dirty="0" err="1" smtClean="0">
+                <a:solidFill>
+                  <a:srgbClr val="0070C0"/>
+                </a:solidFill>
+                <a:latin typeface="Tahoma" panose="020B0604030504040204" pitchFamily="34" charset="0"/>
+                <a:cs typeface="Tahoma" panose="020B0604030504040204" pitchFamily="34" charset="0"/>
+              </a:rPr>
+              <a:t>nhánh</a:t>
+            </a:r>
+            <a:r>
+              <a:rPr lang="en-US" sz="2000" dirty="0" smtClean="0">
+                <a:solidFill>
+                  <a:srgbClr val="0070C0"/>
+                </a:solidFill>
+                <a:latin typeface="Tahoma" panose="020B0604030504040204" pitchFamily="34" charset="0"/>
+                <a:cs typeface="Tahoma" panose="020B0604030504040204" pitchFamily="34" charset="0"/>
+              </a:rPr>
+              <a:t> </a:t>
+            </a:r>
+            <a:r>
+              <a:rPr lang="en-US" sz="2000" dirty="0" err="1" smtClean="0">
+                <a:solidFill>
+                  <a:srgbClr val="0070C0"/>
+                </a:solidFill>
+                <a:latin typeface="Tahoma" panose="020B0604030504040204" pitchFamily="34" charset="0"/>
+                <a:cs typeface="Tahoma" panose="020B0604030504040204" pitchFamily="34" charset="0"/>
+              </a:rPr>
+              <a:t>hướng</a:t>
+            </a:r>
+            <a:r>
+              <a:rPr lang="en-US" sz="2000" dirty="0" smtClean="0">
+                <a:solidFill>
+                  <a:srgbClr val="0070C0"/>
+                </a:solidFill>
+                <a:latin typeface="Tahoma" panose="020B0604030504040204" pitchFamily="34" charset="0"/>
+                <a:cs typeface="Tahoma" panose="020B0604030504040204" pitchFamily="34" charset="0"/>
+              </a:rPr>
+              <a:t> </a:t>
+            </a:r>
+            <a:r>
+              <a:rPr lang="en-US" sz="2000" dirty="0" err="1" smtClean="0">
+                <a:solidFill>
+                  <a:srgbClr val="0070C0"/>
+                </a:solidFill>
+                <a:latin typeface="Tahoma" panose="020B0604030504040204" pitchFamily="34" charset="0"/>
+                <a:cs typeface="Tahoma" panose="020B0604030504040204" pitchFamily="34" charset="0"/>
+              </a:rPr>
+              <a:t>xử</a:t>
+            </a:r>
+            <a:r>
+              <a:rPr lang="en-US" sz="2000" dirty="0" smtClean="0">
+                <a:solidFill>
+                  <a:srgbClr val="0070C0"/>
+                </a:solidFill>
+                <a:latin typeface="Tahoma" panose="020B0604030504040204" pitchFamily="34" charset="0"/>
+                <a:cs typeface="Tahoma" panose="020B0604030504040204" pitchFamily="34" charset="0"/>
+              </a:rPr>
+              <a:t> </a:t>
+            </a:r>
+            <a:r>
+              <a:rPr lang="en-US" sz="2000" dirty="0" err="1" smtClean="0">
+                <a:solidFill>
+                  <a:srgbClr val="0070C0"/>
+                </a:solidFill>
+                <a:latin typeface="Tahoma" panose="020B0604030504040204" pitchFamily="34" charset="0"/>
+                <a:cs typeface="Tahoma" panose="020B0604030504040204" pitchFamily="34" charset="0"/>
+              </a:rPr>
+              <a:t>lý</a:t>
+            </a:r>
+            <a:r>
+              <a:rPr lang="en-US" sz="2000" dirty="0" smtClean="0">
+                <a:solidFill>
+                  <a:srgbClr val="0070C0"/>
+                </a:solidFill>
+                <a:latin typeface="Tahoma" panose="020B0604030504040204" pitchFamily="34" charset="0"/>
+                <a:cs typeface="Tahoma" panose="020B0604030504040204" pitchFamily="34" charset="0"/>
+              </a:rPr>
+              <a:t> </a:t>
+            </a:r>
+            <a:r>
+              <a:rPr lang="en-US" sz="2000" dirty="0" err="1" smtClean="0">
+                <a:solidFill>
+                  <a:srgbClr val="0070C0"/>
+                </a:solidFill>
+                <a:latin typeface="Tahoma" panose="020B0604030504040204" pitchFamily="34" charset="0"/>
+                <a:cs typeface="Tahoma" panose="020B0604030504040204" pitchFamily="34" charset="0"/>
+              </a:rPr>
+              <a:t>đối</a:t>
+            </a:r>
+            <a:r>
+              <a:rPr lang="en-US" sz="2000" dirty="0" smtClean="0">
+                <a:solidFill>
+                  <a:srgbClr val="0070C0"/>
+                </a:solidFill>
+                <a:latin typeface="Tahoma" panose="020B0604030504040204" pitchFamily="34" charset="0"/>
+                <a:cs typeface="Tahoma" panose="020B0604030504040204" pitchFamily="34" charset="0"/>
+              </a:rPr>
+              <a:t> </a:t>
+            </a:r>
+            <a:r>
+              <a:rPr lang="en-US" sz="2000" dirty="0" err="1" smtClean="0">
+                <a:solidFill>
+                  <a:srgbClr val="0070C0"/>
+                </a:solidFill>
+                <a:latin typeface="Tahoma" panose="020B0604030504040204" pitchFamily="34" charset="0"/>
+                <a:cs typeface="Tahoma" panose="020B0604030504040204" pitchFamily="34" charset="0"/>
+              </a:rPr>
+              <a:t>tượng</a:t>
+            </a:r>
+            <a:r>
+              <a:rPr lang="en-US" sz="2000" dirty="0" smtClean="0">
+                <a:solidFill>
+                  <a:srgbClr val="0070C0"/>
+                </a:solidFill>
+                <a:latin typeface="Tahoma" panose="020B0604030504040204" pitchFamily="34" charset="0"/>
+                <a:cs typeface="Tahoma" panose="020B0604030504040204" pitchFamily="34" charset="0"/>
+              </a:rPr>
+              <a:t>.</a:t>
+            </a:r>
+            <a:endParaRPr lang="en-US" sz="2000" dirty="0">
+              <a:solidFill>
+                <a:srgbClr val="0070C0"/>
+              </a:solidFill>
+              <a:latin typeface="Tahoma" panose="020B0604030504040204" pitchFamily="34" charset="0"/>
+              <a:cs typeface="Tahoma" panose="020B0604030504040204" pitchFamily="34" charset="0"/>
+            </a:endParaRPr>
+          </a:p>
+        </p:txBody>
+      </p:sp>
     </p:spTree>
     <p:extLst>
       <p:ext uri="{BB962C8B-B14F-4D97-AF65-F5344CB8AC3E}">
-        <p14:creationId xmlns:p14="http://schemas.microsoft.com/office/powerpoint/2010/main" val="767091856"/>
+        <p14:creationId xmlns:p14="http://schemas.microsoft.com/office/powerpoint/2010/main" val="971826935"/>
+      </p:ext>
+    </p:extLst>
+  </p:cSld>
+  <p:clrMapOvr>
+    <a:masterClrMapping/>
+  </p:clrMapOvr>
+</p:sld>
+</file>
+
+<file path=ppt/slides/slide6.xml><?xml version="1.0" encoding="utf-8"?>
+<p:sld xmlns:a="http://schemas.openxmlformats.org/drawingml/2006/main" xmlns:r="http://schemas.openxmlformats.org/officeDocument/2006/relationships" xmlns:p="http://schemas.openxmlformats.org/presentationml/2006/main">
+  <p:cSld>
+    <p:spTree>
+      <p:nvGrpSpPr>
+        <p:cNvPr id="1" name=""/>
+        <p:cNvGrpSpPr/>
+        <p:nvPr/>
+      </p:nvGrpSpPr>
+      <p:grpSpPr>
+        <a:xfrm>
+          <a:off x="0" y="0"/>
+          <a:ext cx="0" cy="0"/>
+          <a:chOff x="0" y="0"/>
+          <a:chExt cx="0" cy="0"/>
+        </a:xfrm>
+      </p:grpSpPr>
+      <p:sp>
+        <p:nvSpPr>
+          <p:cNvPr id="2" name="Title 1"/>
+          <p:cNvSpPr>
+            <a:spLocks noGrp="1"/>
+          </p:cNvSpPr>
+          <p:nvPr>
+            <p:ph type="title"/>
+          </p:nvPr>
+        </p:nvSpPr>
+        <p:spPr/>
+        <p:txBody>
+          <a:bodyPr/>
+          <a:lstStyle/>
+          <a:p>
+            <a:r>
+              <a:rPr lang="en-US" dirty="0" smtClean="0"/>
+              <a:t>The </a:t>
+            </a:r>
+            <a:r>
+              <a:rPr lang="en-US" dirty="0"/>
+              <a:t>benefits of recursion </a:t>
+            </a:r>
+          </a:p>
+        </p:txBody>
+      </p:sp>
+      <p:sp>
+        <p:nvSpPr>
+          <p:cNvPr id="3" name="Content Placeholder 2"/>
+          <p:cNvSpPr>
+            <a:spLocks noGrp="1"/>
+          </p:cNvSpPr>
+          <p:nvPr>
+            <p:ph idx="1"/>
+          </p:nvPr>
+        </p:nvSpPr>
+        <p:spPr/>
+        <p:txBody>
+          <a:bodyPr/>
+          <a:lstStyle/>
+          <a:p>
+            <a:r>
+              <a:rPr lang="en-US" dirty="0" err="1" smtClean="0"/>
+              <a:t>Các</a:t>
+            </a:r>
+            <a:r>
+              <a:rPr lang="en-US" dirty="0" smtClean="0"/>
+              <a:t> </a:t>
+            </a:r>
+            <a:r>
+              <a:rPr lang="en-US" dirty="0" err="1" smtClean="0"/>
+              <a:t>dòng</a:t>
+            </a:r>
+            <a:r>
+              <a:rPr lang="en-US" dirty="0" smtClean="0"/>
+              <a:t> code </a:t>
+            </a:r>
+            <a:r>
+              <a:rPr lang="en-US" dirty="0" err="1" smtClean="0"/>
+              <a:t>trở</a:t>
+            </a:r>
+            <a:r>
+              <a:rPr lang="en-US" dirty="0" smtClean="0"/>
+              <a:t> </a:t>
+            </a:r>
+            <a:r>
+              <a:rPr lang="en-US" dirty="0" err="1" smtClean="0"/>
+              <a:t>nên</a:t>
+            </a:r>
+            <a:r>
+              <a:rPr lang="en-US" dirty="0" smtClean="0"/>
+              <a:t> </a:t>
+            </a:r>
+            <a:r>
+              <a:rPr lang="en-US" dirty="0" err="1" smtClean="0"/>
+              <a:t>ngắn</a:t>
+            </a:r>
+            <a:r>
+              <a:rPr lang="en-US" dirty="0" smtClean="0"/>
+              <a:t> </a:t>
+            </a:r>
+            <a:r>
+              <a:rPr lang="en-US" dirty="0" err="1" smtClean="0"/>
+              <a:t>gọn</a:t>
+            </a:r>
+            <a:r>
+              <a:rPr lang="en-US" dirty="0" smtClean="0"/>
+              <a:t> </a:t>
+            </a:r>
+            <a:r>
+              <a:rPr lang="en-US" dirty="0" err="1" smtClean="0"/>
+              <a:t>hơn</a:t>
+            </a:r>
+            <a:r>
+              <a:rPr lang="en-US" dirty="0" smtClean="0"/>
+              <a:t>.</a:t>
+            </a:r>
+          </a:p>
+          <a:p>
+            <a:endParaRPr lang="en-US" dirty="0"/>
+          </a:p>
+        </p:txBody>
+      </p:sp>
+      <p:sp>
+        <p:nvSpPr>
+          <p:cNvPr id="4" name="Slide Number Placeholder 3"/>
+          <p:cNvSpPr>
+            <a:spLocks noGrp="1"/>
+          </p:cNvSpPr>
+          <p:nvPr>
+            <p:ph type="sldNum" sz="quarter" idx="12"/>
+          </p:nvPr>
+        </p:nvSpPr>
+        <p:spPr/>
+        <p:txBody>
+          <a:bodyPr/>
+          <a:lstStyle/>
+          <a:p>
+            <a:fld id="{D57F1E4F-1CFF-5643-939E-217C01CDF565}" type="slidenum">
+              <a:rPr lang="en-US" smtClean="0"/>
+              <a:pPr/>
+              <a:t>6</a:t>
+            </a:fld>
+            <a:endParaRPr lang="en-US" dirty="0"/>
+          </a:p>
+        </p:txBody>
+      </p:sp>
+    </p:spTree>
+    <p:extLst>
+      <p:ext uri="{BB962C8B-B14F-4D97-AF65-F5344CB8AC3E}">
+        <p14:creationId xmlns:p14="http://schemas.microsoft.com/office/powerpoint/2010/main" val="2506711080"/>
+      </p:ext>
+    </p:extLst>
+  </p:cSld>
+  <p:clrMapOvr>
+    <a:masterClrMapping/>
+  </p:clrMapOvr>
+</p:sld>
+</file>
+
+<file path=ppt/slides/slide7.xml><?xml version="1.0" encoding="utf-8"?>
+<p:sld xmlns:a="http://schemas.openxmlformats.org/drawingml/2006/main" xmlns:r="http://schemas.openxmlformats.org/officeDocument/2006/relationships" xmlns:p="http://schemas.openxmlformats.org/presentationml/2006/main">
+  <p:cSld>
+    <p:spTree>
+      <p:nvGrpSpPr>
+        <p:cNvPr id="1" name=""/>
+        <p:cNvGrpSpPr/>
+        <p:nvPr/>
+      </p:nvGrpSpPr>
+      <p:grpSpPr>
+        <a:xfrm>
+          <a:off x="0" y="0"/>
+          <a:ext cx="0" cy="0"/>
+          <a:chOff x="0" y="0"/>
+          <a:chExt cx="0" cy="0"/>
+        </a:xfrm>
+      </p:grpSpPr>
+      <p:sp>
+        <p:nvSpPr>
+          <p:cNvPr id="2" name="Title 1"/>
+          <p:cNvSpPr>
+            <a:spLocks noGrp="1"/>
+          </p:cNvSpPr>
+          <p:nvPr>
+            <p:ph type="title"/>
+          </p:nvPr>
+        </p:nvSpPr>
+        <p:spPr/>
+        <p:txBody>
+          <a:bodyPr>
+            <a:normAutofit/>
+          </a:bodyPr>
+          <a:lstStyle/>
+          <a:p>
+            <a:r>
+              <a:rPr lang="en-US" sz="6000" dirty="0"/>
+              <a:t>Growing Functions</a:t>
+            </a:r>
+          </a:p>
+        </p:txBody>
+      </p:sp>
+      <p:sp>
+        <p:nvSpPr>
+          <p:cNvPr id="3" name="Content Placeholder 2"/>
+          <p:cNvSpPr>
+            <a:spLocks noGrp="1"/>
+          </p:cNvSpPr>
+          <p:nvPr>
+            <p:ph idx="1"/>
+          </p:nvPr>
+        </p:nvSpPr>
+        <p:spPr>
+          <a:xfrm>
+            <a:off x="2502948" y="2168104"/>
+            <a:ext cx="8915400" cy="3490823"/>
+          </a:xfrm>
+        </p:spPr>
+        <p:txBody>
+          <a:bodyPr>
+            <a:normAutofit/>
+          </a:bodyPr>
+          <a:lstStyle/>
+          <a:p>
+            <a:pPr>
+              <a:lnSpc>
+                <a:spcPct val="200000"/>
+              </a:lnSpc>
+            </a:pPr>
+            <a:r>
+              <a:rPr lang="en-US" sz="2000" dirty="0" err="1" smtClean="0">
+                <a:solidFill>
+                  <a:srgbClr val="0070C0"/>
+                </a:solidFill>
+                <a:latin typeface="Tahoma" panose="020B0604030504040204" pitchFamily="34" charset="0"/>
+                <a:cs typeface="Tahoma" panose="020B0604030504040204" pitchFamily="34" charset="0"/>
+              </a:rPr>
+              <a:t>Có</a:t>
+            </a:r>
+            <a:r>
+              <a:rPr lang="en-US" sz="2000" dirty="0" smtClean="0">
+                <a:solidFill>
+                  <a:srgbClr val="0070C0"/>
+                </a:solidFill>
+                <a:latin typeface="Tahoma" panose="020B0604030504040204" pitchFamily="34" charset="0"/>
+                <a:cs typeface="Tahoma" panose="020B0604030504040204" pitchFamily="34" charset="0"/>
+              </a:rPr>
+              <a:t> 2 </a:t>
+            </a:r>
+            <a:r>
+              <a:rPr lang="en-US" sz="2000" dirty="0" err="1" smtClean="0">
+                <a:solidFill>
+                  <a:srgbClr val="0070C0"/>
+                </a:solidFill>
+                <a:latin typeface="Tahoma" panose="020B0604030504040204" pitchFamily="34" charset="0"/>
+                <a:cs typeface="Tahoma" panose="020B0604030504040204" pitchFamily="34" charset="0"/>
+              </a:rPr>
+              <a:t>cách</a:t>
+            </a:r>
+            <a:r>
+              <a:rPr lang="en-US" sz="2000" dirty="0" smtClean="0">
+                <a:solidFill>
+                  <a:srgbClr val="0070C0"/>
+                </a:solidFill>
+                <a:latin typeface="Tahoma" panose="020B0604030504040204" pitchFamily="34" charset="0"/>
+                <a:cs typeface="Tahoma" panose="020B0604030504040204" pitchFamily="34" charset="0"/>
+              </a:rPr>
+              <a:t> </a:t>
+            </a:r>
+            <a:r>
+              <a:rPr lang="en-US" sz="2000" dirty="0" err="1" smtClean="0">
+                <a:solidFill>
+                  <a:srgbClr val="0070C0"/>
+                </a:solidFill>
+                <a:latin typeface="Tahoma" panose="020B0604030504040204" pitchFamily="34" charset="0"/>
+                <a:cs typeface="Tahoma" panose="020B0604030504040204" pitchFamily="34" charset="0"/>
+              </a:rPr>
+              <a:t>để</a:t>
+            </a:r>
+            <a:r>
+              <a:rPr lang="en-US" sz="2000" dirty="0" smtClean="0">
+                <a:solidFill>
+                  <a:srgbClr val="0070C0"/>
+                </a:solidFill>
+                <a:latin typeface="Tahoma" panose="020B0604030504040204" pitchFamily="34" charset="0"/>
+                <a:cs typeface="Tahoma" panose="020B0604030504040204" pitchFamily="34" charset="0"/>
+              </a:rPr>
+              <a:t> </a:t>
+            </a:r>
+            <a:r>
+              <a:rPr lang="en-US" sz="2000" dirty="0">
+                <a:solidFill>
+                  <a:srgbClr val="0070C0"/>
+                </a:solidFill>
+                <a:latin typeface="Tahoma" panose="020B0604030504040204" pitchFamily="34" charset="0"/>
+                <a:cs typeface="Tahoma" panose="020B0604030504040204" pitchFamily="34" charset="0"/>
+              </a:rPr>
+              <a:t>Growing </a:t>
+            </a:r>
+            <a:r>
+              <a:rPr lang="en-US" sz="2000" dirty="0" smtClean="0">
+                <a:solidFill>
+                  <a:srgbClr val="0070C0"/>
+                </a:solidFill>
+                <a:latin typeface="Tahoma" panose="020B0604030504040204" pitchFamily="34" charset="0"/>
+                <a:cs typeface="Tahoma" panose="020B0604030504040204" pitchFamily="34" charset="0"/>
+              </a:rPr>
+              <a:t>Functions : </a:t>
+            </a:r>
+          </a:p>
+          <a:p>
+            <a:pPr marL="0" indent="0">
+              <a:lnSpc>
+                <a:spcPct val="200000"/>
+              </a:lnSpc>
+              <a:buNone/>
+            </a:pPr>
+            <a:r>
+              <a:rPr lang="en-US" sz="2000" dirty="0">
+                <a:solidFill>
+                  <a:srgbClr val="0070C0"/>
+                </a:solidFill>
+                <a:latin typeface="Tahoma" panose="020B0604030504040204" pitchFamily="34" charset="0"/>
+                <a:cs typeface="Tahoma" panose="020B0604030504040204" pitchFamily="34" charset="0"/>
+              </a:rPr>
+              <a:t>	</a:t>
+            </a:r>
+            <a:r>
+              <a:rPr lang="en-US" sz="2000" dirty="0" smtClean="0">
+                <a:solidFill>
+                  <a:srgbClr val="0070C0"/>
+                </a:solidFill>
+                <a:latin typeface="Tahoma" panose="020B0604030504040204" pitchFamily="34" charset="0"/>
+                <a:cs typeface="Tahoma" panose="020B0604030504040204" pitchFamily="34" charset="0"/>
+              </a:rPr>
+              <a:t>1 – </a:t>
+            </a:r>
+            <a:r>
+              <a:rPr lang="en-US" sz="2000" dirty="0" err="1" smtClean="0">
+                <a:solidFill>
+                  <a:srgbClr val="0070C0"/>
+                </a:solidFill>
+                <a:latin typeface="Tahoma" panose="020B0604030504040204" pitchFamily="34" charset="0"/>
+                <a:cs typeface="Tahoma" panose="020B0604030504040204" pitchFamily="34" charset="0"/>
+              </a:rPr>
+              <a:t>Khi</a:t>
+            </a:r>
+            <a:r>
+              <a:rPr lang="en-US" sz="2000" dirty="0" smtClean="0">
+                <a:solidFill>
+                  <a:srgbClr val="0070C0"/>
+                </a:solidFill>
+                <a:latin typeface="Tahoma" panose="020B0604030504040204" pitchFamily="34" charset="0"/>
+                <a:cs typeface="Tahoma" panose="020B0604030504040204" pitchFamily="34" charset="0"/>
+              </a:rPr>
+              <a:t> </a:t>
+            </a:r>
+            <a:r>
+              <a:rPr lang="en-US" sz="2000" dirty="0" err="1" smtClean="0">
+                <a:solidFill>
+                  <a:srgbClr val="0070C0"/>
+                </a:solidFill>
+                <a:latin typeface="Tahoma" panose="020B0604030504040204" pitchFamily="34" charset="0"/>
+                <a:cs typeface="Tahoma" panose="020B0604030504040204" pitchFamily="34" charset="0"/>
+              </a:rPr>
+              <a:t>có</a:t>
+            </a:r>
+            <a:r>
+              <a:rPr lang="en-US" sz="2000" dirty="0" smtClean="0">
+                <a:solidFill>
+                  <a:srgbClr val="0070C0"/>
+                </a:solidFill>
+                <a:latin typeface="Tahoma" panose="020B0604030504040204" pitchFamily="34" charset="0"/>
+                <a:cs typeface="Tahoma" panose="020B0604030504040204" pitchFamily="34" charset="0"/>
+              </a:rPr>
+              <a:t> </a:t>
+            </a:r>
+            <a:r>
+              <a:rPr lang="en-US" sz="2000" dirty="0" err="1" smtClean="0">
+                <a:solidFill>
+                  <a:srgbClr val="0070C0"/>
+                </a:solidFill>
+                <a:latin typeface="Tahoma" panose="020B0604030504040204" pitchFamily="34" charset="0"/>
+                <a:cs typeface="Tahoma" panose="020B0604030504040204" pitchFamily="34" charset="0"/>
+              </a:rPr>
+              <a:t>một</a:t>
+            </a:r>
+            <a:r>
+              <a:rPr lang="en-US" sz="2000" dirty="0" smtClean="0">
+                <a:solidFill>
+                  <a:srgbClr val="0070C0"/>
+                </a:solidFill>
+                <a:latin typeface="Tahoma" panose="020B0604030504040204" pitchFamily="34" charset="0"/>
+                <a:cs typeface="Tahoma" panose="020B0604030504040204" pitchFamily="34" charset="0"/>
+              </a:rPr>
+              <a:t> </a:t>
+            </a:r>
+            <a:r>
+              <a:rPr lang="en-US" sz="2000" dirty="0" err="1" smtClean="0">
+                <a:solidFill>
+                  <a:srgbClr val="0070C0"/>
+                </a:solidFill>
+                <a:latin typeface="Tahoma" panose="020B0604030504040204" pitchFamily="34" charset="0"/>
+                <a:cs typeface="Tahoma" panose="020B0604030504040204" pitchFamily="34" charset="0"/>
+              </a:rPr>
+              <a:t>nhiều</a:t>
+            </a:r>
+            <a:r>
+              <a:rPr lang="en-US" sz="2000" dirty="0" smtClean="0">
+                <a:solidFill>
+                  <a:srgbClr val="0070C0"/>
+                </a:solidFill>
+                <a:latin typeface="Tahoma" panose="020B0604030504040204" pitchFamily="34" charset="0"/>
+                <a:cs typeface="Tahoma" panose="020B0604030504040204" pitchFamily="34" charset="0"/>
+              </a:rPr>
+              <a:t> </a:t>
+            </a:r>
+            <a:r>
+              <a:rPr lang="en-US" sz="2000" dirty="0" err="1" smtClean="0">
+                <a:solidFill>
+                  <a:srgbClr val="0070C0"/>
+                </a:solidFill>
+                <a:latin typeface="Tahoma" panose="020B0604030504040204" pitchFamily="34" charset="0"/>
+                <a:cs typeface="Tahoma" panose="020B0604030504040204" pitchFamily="34" charset="0"/>
+              </a:rPr>
+              <a:t>khối</a:t>
+            </a:r>
+            <a:r>
+              <a:rPr lang="en-US" sz="2000" dirty="0" smtClean="0">
+                <a:solidFill>
+                  <a:srgbClr val="0070C0"/>
+                </a:solidFill>
+                <a:latin typeface="Tahoma" panose="020B0604030504040204" pitchFamily="34" charset="0"/>
+                <a:cs typeface="Tahoma" panose="020B0604030504040204" pitchFamily="34" charset="0"/>
+              </a:rPr>
+              <a:t> code </a:t>
+            </a:r>
+            <a:r>
+              <a:rPr lang="en-US" sz="2000" dirty="0" err="1" smtClean="0">
+                <a:solidFill>
+                  <a:srgbClr val="0070C0"/>
+                </a:solidFill>
+                <a:latin typeface="Tahoma" panose="020B0604030504040204" pitchFamily="34" charset="0"/>
+                <a:cs typeface="Tahoma" panose="020B0604030504040204" pitchFamily="34" charset="0"/>
+              </a:rPr>
+              <a:t>lặp</a:t>
+            </a:r>
+            <a:r>
+              <a:rPr lang="en-US" sz="2000" dirty="0" smtClean="0">
+                <a:solidFill>
+                  <a:srgbClr val="0070C0"/>
+                </a:solidFill>
+                <a:latin typeface="Tahoma" panose="020B0604030504040204" pitchFamily="34" charset="0"/>
+                <a:cs typeface="Tahoma" panose="020B0604030504040204" pitchFamily="34" charset="0"/>
+              </a:rPr>
+              <a:t> </a:t>
+            </a:r>
+            <a:r>
+              <a:rPr lang="en-US" sz="2000" dirty="0" err="1" smtClean="0">
+                <a:solidFill>
+                  <a:srgbClr val="0070C0"/>
+                </a:solidFill>
+                <a:latin typeface="Tahoma" panose="020B0604030504040204" pitchFamily="34" charset="0"/>
+                <a:cs typeface="Tahoma" panose="020B0604030504040204" pitchFamily="34" charset="0"/>
+              </a:rPr>
+              <a:t>lại</a:t>
+            </a:r>
+            <a:r>
+              <a:rPr lang="en-US" sz="2000" dirty="0" smtClean="0">
+                <a:solidFill>
+                  <a:srgbClr val="0070C0"/>
+                </a:solidFill>
+                <a:latin typeface="Tahoma" panose="020B0604030504040204" pitchFamily="34" charset="0"/>
+                <a:cs typeface="Tahoma" panose="020B0604030504040204" pitchFamily="34" charset="0"/>
+              </a:rPr>
+              <a:t> </a:t>
+            </a:r>
+            <a:r>
+              <a:rPr lang="en-US" sz="2000" dirty="0" err="1" smtClean="0">
+                <a:solidFill>
+                  <a:srgbClr val="0070C0"/>
+                </a:solidFill>
+                <a:latin typeface="Tahoma" panose="020B0604030504040204" pitchFamily="34" charset="0"/>
+                <a:cs typeface="Tahoma" panose="020B0604030504040204" pitchFamily="34" charset="0"/>
+              </a:rPr>
+              <a:t>chức</a:t>
+            </a:r>
+            <a:r>
+              <a:rPr lang="en-US" sz="2000" dirty="0" smtClean="0">
+                <a:solidFill>
+                  <a:srgbClr val="0070C0"/>
+                </a:solidFill>
+                <a:latin typeface="Tahoma" panose="020B0604030504040204" pitchFamily="34" charset="0"/>
+                <a:cs typeface="Tahoma" panose="020B0604030504040204" pitchFamily="34" charset="0"/>
+              </a:rPr>
+              <a:t> </a:t>
+            </a:r>
+            <a:r>
+              <a:rPr lang="en-US" sz="2000" dirty="0" err="1" smtClean="0">
+                <a:solidFill>
+                  <a:srgbClr val="0070C0"/>
+                </a:solidFill>
+                <a:latin typeface="Tahoma" panose="020B0604030504040204" pitchFamily="34" charset="0"/>
+                <a:cs typeface="Tahoma" panose="020B0604030504040204" pitchFamily="34" charset="0"/>
+              </a:rPr>
+              <a:t>năng</a:t>
+            </a:r>
+            <a:r>
+              <a:rPr lang="en-US" sz="2000" dirty="0" smtClean="0">
+                <a:solidFill>
+                  <a:srgbClr val="0070C0"/>
+                </a:solidFill>
+                <a:latin typeface="Tahoma" panose="020B0604030504040204" pitchFamily="34" charset="0"/>
+                <a:cs typeface="Tahoma" panose="020B0604030504040204" pitchFamily="34" charset="0"/>
+              </a:rPr>
+              <a:t> </a:t>
+            </a:r>
+            <a:r>
+              <a:rPr lang="en-US" sz="2000" dirty="0" err="1" smtClean="0">
+                <a:solidFill>
+                  <a:srgbClr val="0070C0"/>
+                </a:solidFill>
+                <a:latin typeface="Tahoma" panose="020B0604030504040204" pitchFamily="34" charset="0"/>
+                <a:cs typeface="Tahoma" panose="020B0604030504040204" pitchFamily="34" charset="0"/>
+              </a:rPr>
+              <a:t>của</a:t>
+            </a:r>
+            <a:r>
+              <a:rPr lang="en-US" sz="2000" dirty="0" smtClean="0">
+                <a:solidFill>
+                  <a:srgbClr val="0070C0"/>
+                </a:solidFill>
+                <a:latin typeface="Tahoma" panose="020B0604030504040204" pitchFamily="34" charset="0"/>
+                <a:cs typeface="Tahoma" panose="020B0604030504040204" pitchFamily="34" charset="0"/>
+              </a:rPr>
+              <a:t> </a:t>
+            </a:r>
+            <a:r>
+              <a:rPr lang="en-US" sz="2000" dirty="0" err="1" smtClean="0">
+                <a:solidFill>
+                  <a:srgbClr val="0070C0"/>
+                </a:solidFill>
+                <a:latin typeface="Tahoma" panose="020B0604030504040204" pitchFamily="34" charset="0"/>
+                <a:cs typeface="Tahoma" panose="020B0604030504040204" pitchFamily="34" charset="0"/>
+              </a:rPr>
+              <a:t>nhau</a:t>
+            </a:r>
+            <a:r>
+              <a:rPr lang="en-US" sz="2000" dirty="0" smtClean="0">
+                <a:solidFill>
+                  <a:srgbClr val="0070C0"/>
+                </a:solidFill>
+                <a:latin typeface="Tahoma" panose="020B0604030504040204" pitchFamily="34" charset="0"/>
+                <a:cs typeface="Tahoma" panose="020B0604030504040204" pitchFamily="34" charset="0"/>
+              </a:rPr>
+              <a:t>.</a:t>
+            </a:r>
+          </a:p>
+          <a:p>
+            <a:pPr marL="0" indent="0">
+              <a:lnSpc>
+                <a:spcPct val="200000"/>
+              </a:lnSpc>
+              <a:buNone/>
+            </a:pPr>
+            <a:r>
+              <a:rPr lang="en-US" sz="2000" dirty="0" smtClean="0">
+                <a:solidFill>
+                  <a:srgbClr val="0070C0"/>
+                </a:solidFill>
+                <a:latin typeface="Tahoma" panose="020B0604030504040204" pitchFamily="34" charset="0"/>
+                <a:cs typeface="Tahoma" panose="020B0604030504040204" pitchFamily="34" charset="0"/>
+              </a:rPr>
+              <a:t>	2 – </a:t>
+            </a:r>
+            <a:r>
+              <a:rPr lang="en-US" sz="2000" dirty="0" err="1" smtClean="0">
+                <a:solidFill>
+                  <a:srgbClr val="0070C0"/>
+                </a:solidFill>
+                <a:latin typeface="Tahoma" panose="020B0604030504040204" pitchFamily="34" charset="0"/>
+                <a:cs typeface="Tahoma" panose="020B0604030504040204" pitchFamily="34" charset="0"/>
+              </a:rPr>
+              <a:t>Có</a:t>
+            </a:r>
+            <a:r>
+              <a:rPr lang="en-US" sz="2000" dirty="0" smtClean="0">
+                <a:solidFill>
+                  <a:srgbClr val="0070C0"/>
+                </a:solidFill>
+                <a:latin typeface="Tahoma" panose="020B0604030504040204" pitchFamily="34" charset="0"/>
+                <a:cs typeface="Tahoma" panose="020B0604030504040204" pitchFamily="34" charset="0"/>
+              </a:rPr>
+              <a:t> </a:t>
+            </a:r>
+            <a:r>
+              <a:rPr lang="en-US" sz="2000" dirty="0" err="1" smtClean="0">
+                <a:solidFill>
+                  <a:srgbClr val="0070C0"/>
+                </a:solidFill>
+                <a:latin typeface="Tahoma" panose="020B0604030504040204" pitchFamily="34" charset="0"/>
+                <a:cs typeface="Tahoma" panose="020B0604030504040204" pitchFamily="34" charset="0"/>
+              </a:rPr>
+              <a:t>những</a:t>
+            </a:r>
+            <a:r>
+              <a:rPr lang="en-US" sz="2000" dirty="0" smtClean="0">
+                <a:solidFill>
+                  <a:srgbClr val="0070C0"/>
+                </a:solidFill>
+                <a:latin typeface="Tahoma" panose="020B0604030504040204" pitchFamily="34" charset="0"/>
+                <a:cs typeface="Tahoma" panose="020B0604030504040204" pitchFamily="34" charset="0"/>
+              </a:rPr>
+              <a:t> </a:t>
+            </a:r>
+            <a:r>
+              <a:rPr lang="en-US" sz="2000" dirty="0" err="1" smtClean="0">
+                <a:solidFill>
+                  <a:srgbClr val="0070C0"/>
+                </a:solidFill>
+                <a:latin typeface="Tahoma" panose="020B0604030504040204" pitchFamily="34" charset="0"/>
+                <a:cs typeface="Tahoma" panose="020B0604030504040204" pitchFamily="34" charset="0"/>
+              </a:rPr>
+              <a:t>hàm</a:t>
+            </a:r>
+            <a:r>
+              <a:rPr lang="en-US" sz="2000" dirty="0" smtClean="0">
+                <a:solidFill>
+                  <a:srgbClr val="0070C0"/>
+                </a:solidFill>
+                <a:latin typeface="Tahoma" panose="020B0604030504040204" pitchFamily="34" charset="0"/>
+                <a:cs typeface="Tahoma" panose="020B0604030504040204" pitchFamily="34" charset="0"/>
+              </a:rPr>
+              <a:t> </a:t>
+            </a:r>
+            <a:r>
+              <a:rPr lang="en-US" sz="2000" dirty="0" err="1" smtClean="0">
+                <a:solidFill>
+                  <a:srgbClr val="0070C0"/>
+                </a:solidFill>
+                <a:latin typeface="Tahoma" panose="020B0604030504040204" pitchFamily="34" charset="0"/>
+                <a:cs typeface="Tahoma" panose="020B0604030504040204" pitchFamily="34" charset="0"/>
+              </a:rPr>
+              <a:t>chức</a:t>
+            </a:r>
+            <a:r>
+              <a:rPr lang="en-US" sz="2000" dirty="0" smtClean="0">
+                <a:solidFill>
+                  <a:srgbClr val="0070C0"/>
+                </a:solidFill>
+                <a:latin typeface="Tahoma" panose="020B0604030504040204" pitchFamily="34" charset="0"/>
+                <a:cs typeface="Tahoma" panose="020B0604030504040204" pitchFamily="34" charset="0"/>
+              </a:rPr>
+              <a:t> </a:t>
+            </a:r>
+            <a:r>
+              <a:rPr lang="en-US" sz="2000" dirty="0" err="1" smtClean="0">
+                <a:solidFill>
+                  <a:srgbClr val="0070C0"/>
+                </a:solidFill>
+                <a:latin typeface="Tahoma" panose="020B0604030504040204" pitchFamily="34" charset="0"/>
+                <a:cs typeface="Tahoma" panose="020B0604030504040204" pitchFamily="34" charset="0"/>
+              </a:rPr>
+              <a:t>năng</a:t>
+            </a:r>
+            <a:r>
+              <a:rPr lang="en-US" sz="2000" dirty="0" smtClean="0">
+                <a:solidFill>
+                  <a:srgbClr val="0070C0"/>
+                </a:solidFill>
+                <a:latin typeface="Tahoma" panose="020B0604030504040204" pitchFamily="34" charset="0"/>
+                <a:cs typeface="Tahoma" panose="020B0604030504040204" pitchFamily="34" charset="0"/>
+              </a:rPr>
+              <a:t> </a:t>
+            </a:r>
+            <a:r>
+              <a:rPr lang="en-US" sz="2000" dirty="0" err="1" smtClean="0">
+                <a:solidFill>
+                  <a:srgbClr val="0070C0"/>
+                </a:solidFill>
+                <a:latin typeface="Tahoma" panose="020B0604030504040204" pitchFamily="34" charset="0"/>
+                <a:cs typeface="Tahoma" panose="020B0604030504040204" pitchFamily="34" charset="0"/>
+              </a:rPr>
+              <a:t>cần</a:t>
+            </a:r>
+            <a:r>
+              <a:rPr lang="en-US" sz="2000" dirty="0" smtClean="0">
+                <a:solidFill>
+                  <a:srgbClr val="0070C0"/>
+                </a:solidFill>
+                <a:latin typeface="Tahoma" panose="020B0604030504040204" pitchFamily="34" charset="0"/>
+                <a:cs typeface="Tahoma" panose="020B0604030504040204" pitchFamily="34" charset="0"/>
+              </a:rPr>
+              <a:t> </a:t>
+            </a:r>
+            <a:r>
+              <a:rPr lang="en-US" sz="2000" dirty="0" err="1" smtClean="0">
+                <a:solidFill>
+                  <a:srgbClr val="0070C0"/>
+                </a:solidFill>
+                <a:latin typeface="Tahoma" panose="020B0604030504040204" pitchFamily="34" charset="0"/>
+                <a:cs typeface="Tahoma" panose="020B0604030504040204" pitchFamily="34" charset="0"/>
+              </a:rPr>
+              <a:t>thiết</a:t>
+            </a:r>
+            <a:r>
+              <a:rPr lang="en-US" sz="2000" dirty="0" smtClean="0">
+                <a:solidFill>
+                  <a:srgbClr val="0070C0"/>
+                </a:solidFill>
+                <a:latin typeface="Tahoma" panose="020B0604030504040204" pitchFamily="34" charset="0"/>
+                <a:cs typeface="Tahoma" panose="020B0604030504040204" pitchFamily="34" charset="0"/>
+              </a:rPr>
+              <a:t> </a:t>
+            </a:r>
+            <a:r>
+              <a:rPr lang="en-US" sz="2000" dirty="0" err="1" smtClean="0">
+                <a:solidFill>
+                  <a:srgbClr val="0070C0"/>
+                </a:solidFill>
+                <a:latin typeface="Tahoma" panose="020B0604030504040204" pitchFamily="34" charset="0"/>
+                <a:cs typeface="Tahoma" panose="020B0604030504040204" pitchFamily="34" charset="0"/>
+              </a:rPr>
+              <a:t>trong</a:t>
+            </a:r>
+            <a:r>
+              <a:rPr lang="en-US" sz="2000" dirty="0" smtClean="0">
+                <a:solidFill>
+                  <a:srgbClr val="0070C0"/>
+                </a:solidFill>
+                <a:latin typeface="Tahoma" panose="020B0604030504040204" pitchFamily="34" charset="0"/>
+                <a:cs typeface="Tahoma" panose="020B0604030504040204" pitchFamily="34" charset="0"/>
+              </a:rPr>
+              <a:t> </a:t>
+            </a:r>
+            <a:r>
+              <a:rPr lang="en-US" sz="2000" dirty="0" err="1" smtClean="0">
+                <a:solidFill>
+                  <a:srgbClr val="0070C0"/>
+                </a:solidFill>
+                <a:latin typeface="Tahoma" panose="020B0604030504040204" pitchFamily="34" charset="0"/>
+                <a:cs typeface="Tahoma" panose="020B0604030504040204" pitchFamily="34" charset="0"/>
+              </a:rPr>
+              <a:t>khi</a:t>
+            </a:r>
+            <a:r>
+              <a:rPr lang="en-US" sz="2000" dirty="0" smtClean="0">
+                <a:solidFill>
+                  <a:srgbClr val="0070C0"/>
+                </a:solidFill>
+                <a:latin typeface="Tahoma" panose="020B0604030504040204" pitchFamily="34" charset="0"/>
+                <a:cs typeface="Tahoma" panose="020B0604030504040204" pitchFamily="34" charset="0"/>
+              </a:rPr>
+              <a:t> code , </a:t>
+            </a:r>
+            <a:r>
+              <a:rPr lang="en-US" sz="2000" dirty="0" err="1" smtClean="0">
+                <a:solidFill>
+                  <a:srgbClr val="0070C0"/>
+                </a:solidFill>
+                <a:latin typeface="Tahoma" panose="020B0604030504040204" pitchFamily="34" charset="0"/>
+                <a:cs typeface="Tahoma" panose="020B0604030504040204" pitchFamily="34" charset="0"/>
+              </a:rPr>
+              <a:t>sẽ</a:t>
+            </a:r>
+            <a:r>
+              <a:rPr lang="en-US" sz="2000" dirty="0" smtClean="0">
+                <a:solidFill>
+                  <a:srgbClr val="0070C0"/>
+                </a:solidFill>
+                <a:latin typeface="Tahoma" panose="020B0604030504040204" pitchFamily="34" charset="0"/>
+                <a:cs typeface="Tahoma" panose="020B0604030504040204" pitchFamily="34" charset="0"/>
+              </a:rPr>
+              <a:t> </a:t>
+            </a:r>
+            <a:r>
+              <a:rPr lang="en-US" sz="2000" dirty="0" err="1" smtClean="0">
+                <a:solidFill>
+                  <a:srgbClr val="0070C0"/>
+                </a:solidFill>
+                <a:latin typeface="Tahoma" panose="020B0604030504040204" pitchFamily="34" charset="0"/>
+                <a:cs typeface="Tahoma" panose="020B0604030504040204" pitchFamily="34" charset="0"/>
+              </a:rPr>
+              <a:t>đc</a:t>
+            </a:r>
+            <a:r>
+              <a:rPr lang="en-US" sz="2000" dirty="0" smtClean="0">
+                <a:solidFill>
+                  <a:srgbClr val="0070C0"/>
+                </a:solidFill>
+                <a:latin typeface="Tahoma" panose="020B0604030504040204" pitchFamily="34" charset="0"/>
+                <a:cs typeface="Tahoma" panose="020B0604030504040204" pitchFamily="34" charset="0"/>
+              </a:rPr>
+              <a:t> </a:t>
+            </a:r>
+            <a:r>
+              <a:rPr lang="en-US" sz="2000" dirty="0" err="1" smtClean="0">
+                <a:solidFill>
+                  <a:srgbClr val="0070C0"/>
+                </a:solidFill>
+                <a:latin typeface="Tahoma" panose="020B0604030504040204" pitchFamily="34" charset="0"/>
+                <a:cs typeface="Tahoma" panose="020B0604030504040204" pitchFamily="34" charset="0"/>
+              </a:rPr>
+              <a:t>gọi</a:t>
+            </a:r>
+            <a:r>
+              <a:rPr lang="en-US" sz="2000" dirty="0" smtClean="0">
+                <a:solidFill>
+                  <a:srgbClr val="0070C0"/>
+                </a:solidFill>
+                <a:latin typeface="Tahoma" panose="020B0604030504040204" pitchFamily="34" charset="0"/>
+                <a:cs typeface="Tahoma" panose="020B0604030504040204" pitchFamily="34" charset="0"/>
+              </a:rPr>
+              <a:t> </a:t>
+            </a:r>
+            <a:r>
+              <a:rPr lang="en-US" sz="2000" dirty="0" err="1" smtClean="0">
+                <a:solidFill>
+                  <a:srgbClr val="0070C0"/>
+                </a:solidFill>
+                <a:latin typeface="Tahoma" panose="020B0604030504040204" pitchFamily="34" charset="0"/>
+                <a:cs typeface="Tahoma" panose="020B0604030504040204" pitchFamily="34" charset="0"/>
+              </a:rPr>
+              <a:t>trước</a:t>
+            </a:r>
+            <a:r>
+              <a:rPr lang="en-US" sz="2000" dirty="0" smtClean="0">
+                <a:solidFill>
+                  <a:srgbClr val="0070C0"/>
+                </a:solidFill>
+                <a:latin typeface="Tahoma" panose="020B0604030504040204" pitchFamily="34" charset="0"/>
+                <a:cs typeface="Tahoma" panose="020B0604030504040204" pitchFamily="34" charset="0"/>
+              </a:rPr>
+              <a:t> </a:t>
+            </a:r>
+            <a:r>
+              <a:rPr lang="en-US" sz="2000" dirty="0" err="1" smtClean="0">
+                <a:solidFill>
+                  <a:srgbClr val="0070C0"/>
+                </a:solidFill>
+                <a:latin typeface="Tahoma" panose="020B0604030504040204" pitchFamily="34" charset="0"/>
+                <a:cs typeface="Tahoma" panose="020B0604030504040204" pitchFamily="34" charset="0"/>
+              </a:rPr>
+              <a:t>khi</a:t>
+            </a:r>
+            <a:r>
+              <a:rPr lang="en-US" sz="2000" dirty="0" smtClean="0">
+                <a:solidFill>
+                  <a:srgbClr val="0070C0"/>
+                </a:solidFill>
+                <a:latin typeface="Tahoma" panose="020B0604030504040204" pitchFamily="34" charset="0"/>
+                <a:cs typeface="Tahoma" panose="020B0604030504040204" pitchFamily="34" charset="0"/>
+              </a:rPr>
+              <a:t> </a:t>
+            </a:r>
+            <a:r>
+              <a:rPr lang="en-US" sz="2000" dirty="0" err="1" smtClean="0">
+                <a:solidFill>
+                  <a:srgbClr val="0070C0"/>
+                </a:solidFill>
+                <a:latin typeface="Tahoma" panose="020B0604030504040204" pitchFamily="34" charset="0"/>
+                <a:cs typeface="Tahoma" panose="020B0604030504040204" pitchFamily="34" charset="0"/>
+              </a:rPr>
+              <a:t>viết</a:t>
+            </a:r>
+            <a:r>
+              <a:rPr lang="en-US" sz="2000" dirty="0" smtClean="0">
+                <a:solidFill>
+                  <a:srgbClr val="0070C0"/>
+                </a:solidFill>
+                <a:latin typeface="Tahoma" panose="020B0604030504040204" pitchFamily="34" charset="0"/>
+                <a:cs typeface="Tahoma" panose="020B0604030504040204" pitchFamily="34" charset="0"/>
+              </a:rPr>
+              <a:t> </a:t>
+            </a:r>
+            <a:r>
+              <a:rPr lang="en-US" sz="2000" dirty="0" err="1" smtClean="0">
+                <a:solidFill>
+                  <a:srgbClr val="0070C0"/>
+                </a:solidFill>
+                <a:latin typeface="Tahoma" panose="020B0604030504040204" pitchFamily="34" charset="0"/>
+                <a:cs typeface="Tahoma" panose="020B0604030504040204" pitchFamily="34" charset="0"/>
+              </a:rPr>
+              <a:t>thân</a:t>
+            </a:r>
+            <a:r>
+              <a:rPr lang="en-US" sz="2000" dirty="0" smtClean="0">
+                <a:solidFill>
+                  <a:srgbClr val="0070C0"/>
+                </a:solidFill>
+                <a:latin typeface="Tahoma" panose="020B0604030504040204" pitchFamily="34" charset="0"/>
+                <a:cs typeface="Tahoma" panose="020B0604030504040204" pitchFamily="34" charset="0"/>
+              </a:rPr>
+              <a:t> </a:t>
+            </a:r>
+            <a:r>
+              <a:rPr lang="en-US" sz="2000" dirty="0" err="1" smtClean="0">
+                <a:solidFill>
+                  <a:srgbClr val="0070C0"/>
+                </a:solidFill>
+                <a:latin typeface="Tahoma" panose="020B0604030504040204" pitchFamily="34" charset="0"/>
+                <a:cs typeface="Tahoma" panose="020B0604030504040204" pitchFamily="34" charset="0"/>
+              </a:rPr>
+              <a:t>giao</a:t>
+            </a:r>
+            <a:r>
+              <a:rPr lang="en-US" sz="2000" dirty="0" smtClean="0">
+                <a:solidFill>
+                  <a:srgbClr val="0070C0"/>
+                </a:solidFill>
+                <a:latin typeface="Tahoma" panose="020B0604030504040204" pitchFamily="34" charset="0"/>
+                <a:cs typeface="Tahoma" panose="020B0604030504040204" pitchFamily="34" charset="0"/>
+              </a:rPr>
+              <a:t> </a:t>
+            </a:r>
+            <a:r>
+              <a:rPr lang="en-US" sz="2000" dirty="0" err="1" smtClean="0">
+                <a:solidFill>
+                  <a:srgbClr val="0070C0"/>
+                </a:solidFill>
+                <a:latin typeface="Tahoma" panose="020B0604030504040204" pitchFamily="34" charset="0"/>
+                <a:cs typeface="Tahoma" panose="020B0604030504040204" pitchFamily="34" charset="0"/>
+              </a:rPr>
+              <a:t>chức</a:t>
+            </a:r>
+            <a:r>
+              <a:rPr lang="en-US" sz="2000" dirty="0" smtClean="0">
+                <a:solidFill>
+                  <a:srgbClr val="0070C0"/>
+                </a:solidFill>
+                <a:latin typeface="Tahoma" panose="020B0604030504040204" pitchFamily="34" charset="0"/>
+                <a:cs typeface="Tahoma" panose="020B0604030504040204" pitchFamily="34" charset="0"/>
+              </a:rPr>
+              <a:t> </a:t>
+            </a:r>
+            <a:r>
+              <a:rPr lang="en-US" sz="2000" dirty="0" err="1" smtClean="0">
+                <a:solidFill>
+                  <a:srgbClr val="0070C0"/>
+                </a:solidFill>
+                <a:latin typeface="Tahoma" panose="020B0604030504040204" pitchFamily="34" charset="0"/>
+                <a:cs typeface="Tahoma" panose="020B0604030504040204" pitchFamily="34" charset="0"/>
+              </a:rPr>
+              <a:t>năng</a:t>
+            </a:r>
+            <a:r>
+              <a:rPr lang="en-US" sz="2000" dirty="0" smtClean="0">
+                <a:solidFill>
+                  <a:srgbClr val="0070C0"/>
+                </a:solidFill>
+                <a:latin typeface="Tahoma" panose="020B0604030504040204" pitchFamily="34" charset="0"/>
+                <a:cs typeface="Tahoma" panose="020B0604030504040204" pitchFamily="34" charset="0"/>
+              </a:rPr>
+              <a:t> </a:t>
+            </a:r>
+            <a:r>
+              <a:rPr lang="en-US" sz="2000" dirty="0" err="1" smtClean="0">
+                <a:solidFill>
+                  <a:srgbClr val="0070C0"/>
+                </a:solidFill>
+                <a:latin typeface="Tahoma" panose="020B0604030504040204" pitchFamily="34" charset="0"/>
+                <a:cs typeface="Tahoma" panose="020B0604030504040204" pitchFamily="34" charset="0"/>
+              </a:rPr>
+              <a:t>cho</a:t>
+            </a:r>
+            <a:r>
+              <a:rPr lang="en-US" sz="2000" dirty="0" smtClean="0">
+                <a:solidFill>
+                  <a:srgbClr val="0070C0"/>
+                </a:solidFill>
+                <a:latin typeface="Tahoma" panose="020B0604030504040204" pitchFamily="34" charset="0"/>
+                <a:cs typeface="Tahoma" panose="020B0604030504040204" pitchFamily="34" charset="0"/>
+              </a:rPr>
+              <a:t> </a:t>
+            </a:r>
+            <a:r>
+              <a:rPr lang="en-US" sz="2000" dirty="0" err="1" smtClean="0">
+                <a:solidFill>
+                  <a:srgbClr val="0070C0"/>
+                </a:solidFill>
+                <a:latin typeface="Tahoma" panose="020B0604030504040204" pitchFamily="34" charset="0"/>
+                <a:cs typeface="Tahoma" panose="020B0604030504040204" pitchFamily="34" charset="0"/>
+              </a:rPr>
+              <a:t>nó</a:t>
+            </a:r>
+            <a:r>
+              <a:rPr lang="en-US" sz="2000" dirty="0" smtClean="0">
+                <a:solidFill>
+                  <a:srgbClr val="0070C0"/>
+                </a:solidFill>
+                <a:latin typeface="Tahoma" panose="020B0604030504040204" pitchFamily="34" charset="0"/>
+                <a:cs typeface="Tahoma" panose="020B0604030504040204" pitchFamily="34" charset="0"/>
+              </a:rPr>
+              <a:t>.</a:t>
+            </a:r>
+            <a:endParaRPr lang="en-US" sz="2000" dirty="0">
+              <a:solidFill>
+                <a:srgbClr val="0070C0"/>
+              </a:solidFill>
+              <a:latin typeface="Tahoma" panose="020B0604030504040204" pitchFamily="34" charset="0"/>
+              <a:cs typeface="Tahoma" panose="020B0604030504040204" pitchFamily="34" charset="0"/>
+            </a:endParaRPr>
+          </a:p>
+        </p:txBody>
+      </p:sp>
+      <p:sp>
+        <p:nvSpPr>
+          <p:cNvPr id="4" name="Slide Number Placeholder 3"/>
+          <p:cNvSpPr>
+            <a:spLocks noGrp="1"/>
+          </p:cNvSpPr>
+          <p:nvPr>
+            <p:ph type="sldNum" sz="quarter" idx="12"/>
+          </p:nvPr>
+        </p:nvSpPr>
+        <p:spPr/>
+        <p:txBody>
+          <a:bodyPr/>
+          <a:lstStyle/>
+          <a:p>
+            <a:fld id="{D57F1E4F-1CFF-5643-939E-217C01CDF565}" type="slidenum">
+              <a:rPr lang="en-US" smtClean="0"/>
+              <a:pPr/>
+              <a:t>7</a:t>
+            </a:fld>
+            <a:endParaRPr lang="en-US" dirty="0"/>
+          </a:p>
+        </p:txBody>
+      </p:sp>
+      <p:pic>
+        <p:nvPicPr>
+          <p:cNvPr id="5" name="Picture 4"/>
+          <p:cNvPicPr>
+            <a:picLocks noChangeAspect="1"/>
+          </p:cNvPicPr>
+          <p:nvPr/>
+        </p:nvPicPr>
+        <p:blipFill>
+          <a:blip r:embed="rId2">
+            <a:extLst>
+              <a:ext uri="{28A0092B-C50C-407E-A947-70E740481C1C}">
+                <a14:useLocalDpi xmlns:a14="http://schemas.microsoft.com/office/drawing/2010/main" val="0"/>
+              </a:ext>
+            </a:extLst>
+          </a:blip>
+          <a:stretch>
+            <a:fillRect/>
+          </a:stretch>
+        </p:blipFill>
+        <p:spPr>
+          <a:xfrm>
+            <a:off x="4799417" y="4986068"/>
+            <a:ext cx="4322462" cy="1871932"/>
+          </a:xfrm>
+          <a:prstGeom prst="rect">
+            <a:avLst/>
+          </a:prstGeom>
+        </p:spPr>
+      </p:pic>
+    </p:spTree>
+    <p:extLst>
+      <p:ext uri="{BB962C8B-B14F-4D97-AF65-F5344CB8AC3E}">
+        <p14:creationId xmlns:p14="http://schemas.microsoft.com/office/powerpoint/2010/main" val="708638276"/>
+      </p:ext>
+    </p:extLst>
+  </p:cSld>
+  <p:clrMapOvr>
+    <a:masterClrMapping/>
+  </p:clrMapOvr>
+</p:sld>
+</file>
+
+<file path=ppt/slides/slide8.xml><?xml version="1.0" encoding="utf-8"?>
+<p:sld xmlns:a="http://schemas.openxmlformats.org/drawingml/2006/main" xmlns:r="http://schemas.openxmlformats.org/officeDocument/2006/relationships" xmlns:p="http://schemas.openxmlformats.org/presentationml/2006/main">
+  <p:cSld>
+    <p:spTree>
+      <p:nvGrpSpPr>
+        <p:cNvPr id="1" name=""/>
+        <p:cNvGrpSpPr/>
+        <p:nvPr/>
+      </p:nvGrpSpPr>
+      <p:grpSpPr>
+        <a:xfrm>
+          <a:off x="0" y="0"/>
+          <a:ext cx="0" cy="0"/>
+          <a:chOff x="0" y="0"/>
+          <a:chExt cx="0" cy="0"/>
+        </a:xfrm>
+      </p:grpSpPr>
+      <p:sp>
+        <p:nvSpPr>
+          <p:cNvPr id="2" name="Title 1"/>
+          <p:cNvSpPr>
+            <a:spLocks noGrp="1"/>
+          </p:cNvSpPr>
+          <p:nvPr>
+            <p:ph type="title"/>
+          </p:nvPr>
+        </p:nvSpPr>
+        <p:spPr/>
+        <p:txBody>
+          <a:bodyPr/>
+          <a:lstStyle/>
+          <a:p>
+            <a:r>
+              <a:rPr lang="en-US" dirty="0" smtClean="0"/>
+              <a:t>The </a:t>
+            </a:r>
+            <a:r>
+              <a:rPr lang="en-US" dirty="0"/>
+              <a:t>concept behind function ?</a:t>
+            </a:r>
+          </a:p>
+        </p:txBody>
+      </p:sp>
+      <p:sp>
+        <p:nvSpPr>
+          <p:cNvPr id="3" name="Content Placeholder 2"/>
+          <p:cNvSpPr>
+            <a:spLocks noGrp="1"/>
+          </p:cNvSpPr>
+          <p:nvPr>
+            <p:ph idx="1"/>
+          </p:nvPr>
+        </p:nvSpPr>
+        <p:spPr/>
+        <p:txBody>
+          <a:bodyPr>
+            <a:normAutofit/>
+          </a:bodyPr>
+          <a:lstStyle/>
+          <a:p>
+            <a:r>
+              <a:rPr lang="en-US" sz="2000" dirty="0" err="1" smtClean="0">
+                <a:solidFill>
+                  <a:srgbClr val="0070C0"/>
+                </a:solidFill>
+                <a:latin typeface="Tahoma" panose="020B0604030504040204" pitchFamily="34" charset="0"/>
+                <a:cs typeface="Tahoma" panose="020B0604030504040204" pitchFamily="34" charset="0"/>
+              </a:rPr>
+              <a:t>Giảm</a:t>
+            </a:r>
+            <a:r>
+              <a:rPr lang="en-US" sz="2000" dirty="0" smtClean="0">
+                <a:solidFill>
+                  <a:srgbClr val="0070C0"/>
+                </a:solidFill>
+                <a:latin typeface="Tahoma" panose="020B0604030504040204" pitchFamily="34" charset="0"/>
+                <a:cs typeface="Tahoma" panose="020B0604030504040204" pitchFamily="34" charset="0"/>
+              </a:rPr>
+              <a:t> </a:t>
+            </a:r>
+            <a:r>
+              <a:rPr lang="en-US" sz="2000" dirty="0" err="1" smtClean="0">
+                <a:solidFill>
+                  <a:srgbClr val="0070C0"/>
+                </a:solidFill>
+                <a:latin typeface="Tahoma" panose="020B0604030504040204" pitchFamily="34" charset="0"/>
+                <a:cs typeface="Tahoma" panose="020B0604030504040204" pitchFamily="34" charset="0"/>
+              </a:rPr>
+              <a:t>thiểu</a:t>
+            </a:r>
+            <a:r>
+              <a:rPr lang="en-US" sz="2000" dirty="0" smtClean="0">
+                <a:solidFill>
+                  <a:srgbClr val="0070C0"/>
+                </a:solidFill>
+                <a:latin typeface="Tahoma" panose="020B0604030504040204" pitchFamily="34" charset="0"/>
+                <a:cs typeface="Tahoma" panose="020B0604030504040204" pitchFamily="34" charset="0"/>
+              </a:rPr>
+              <a:t> </a:t>
+            </a:r>
+            <a:r>
+              <a:rPr lang="en-US" sz="2000" dirty="0" err="1" smtClean="0">
+                <a:solidFill>
+                  <a:srgbClr val="0070C0"/>
+                </a:solidFill>
+                <a:latin typeface="Tahoma" panose="020B0604030504040204" pitchFamily="34" charset="0"/>
+                <a:cs typeface="Tahoma" panose="020B0604030504040204" pitchFamily="34" charset="0"/>
+              </a:rPr>
+              <a:t>khả</a:t>
+            </a:r>
+            <a:r>
+              <a:rPr lang="en-US" sz="2000" dirty="0" smtClean="0">
+                <a:solidFill>
+                  <a:srgbClr val="0070C0"/>
+                </a:solidFill>
+                <a:latin typeface="Tahoma" panose="020B0604030504040204" pitchFamily="34" charset="0"/>
+                <a:cs typeface="Tahoma" panose="020B0604030504040204" pitchFamily="34" charset="0"/>
+              </a:rPr>
+              <a:t> </a:t>
+            </a:r>
+            <a:r>
+              <a:rPr lang="en-US" sz="2000" dirty="0" err="1" smtClean="0">
+                <a:solidFill>
+                  <a:srgbClr val="0070C0"/>
+                </a:solidFill>
+                <a:latin typeface="Tahoma" panose="020B0604030504040204" pitchFamily="34" charset="0"/>
+                <a:cs typeface="Tahoma" panose="020B0604030504040204" pitchFamily="34" charset="0"/>
+              </a:rPr>
+              <a:t>năng</a:t>
+            </a:r>
+            <a:r>
+              <a:rPr lang="en-US" sz="2000" dirty="0" smtClean="0">
+                <a:solidFill>
+                  <a:srgbClr val="0070C0"/>
+                </a:solidFill>
+                <a:latin typeface="Tahoma" panose="020B0604030504040204" pitchFamily="34" charset="0"/>
+                <a:cs typeface="Tahoma" panose="020B0604030504040204" pitchFamily="34" charset="0"/>
+              </a:rPr>
+              <a:t> </a:t>
+            </a:r>
+            <a:r>
+              <a:rPr lang="en-US" sz="2000" dirty="0" err="1" smtClean="0">
+                <a:solidFill>
+                  <a:srgbClr val="0070C0"/>
+                </a:solidFill>
+                <a:latin typeface="Tahoma" panose="020B0604030504040204" pitchFamily="34" charset="0"/>
+                <a:cs typeface="Tahoma" panose="020B0604030504040204" pitchFamily="34" charset="0"/>
+              </a:rPr>
+              <a:t>gây</a:t>
+            </a:r>
+            <a:r>
+              <a:rPr lang="en-US" sz="2000" dirty="0" smtClean="0">
+                <a:solidFill>
+                  <a:srgbClr val="0070C0"/>
+                </a:solidFill>
+                <a:latin typeface="Tahoma" panose="020B0604030504040204" pitchFamily="34" charset="0"/>
+                <a:cs typeface="Tahoma" panose="020B0604030504040204" pitchFamily="34" charset="0"/>
+              </a:rPr>
+              <a:t> </a:t>
+            </a:r>
+            <a:r>
+              <a:rPr lang="en-US" sz="2000" dirty="0" err="1" smtClean="0">
+                <a:solidFill>
+                  <a:srgbClr val="0070C0"/>
+                </a:solidFill>
+                <a:latin typeface="Tahoma" panose="020B0604030504040204" pitchFamily="34" charset="0"/>
+                <a:cs typeface="Tahoma" panose="020B0604030504040204" pitchFamily="34" charset="0"/>
+              </a:rPr>
+              <a:t>ra</a:t>
+            </a:r>
+            <a:r>
+              <a:rPr lang="en-US" sz="2000" dirty="0" smtClean="0">
+                <a:solidFill>
+                  <a:srgbClr val="0070C0"/>
+                </a:solidFill>
+                <a:latin typeface="Tahoma" panose="020B0604030504040204" pitchFamily="34" charset="0"/>
+                <a:cs typeface="Tahoma" panose="020B0604030504040204" pitchFamily="34" charset="0"/>
+              </a:rPr>
+              <a:t> </a:t>
+            </a:r>
+            <a:r>
+              <a:rPr lang="en-US" sz="2000" dirty="0" err="1" smtClean="0">
+                <a:solidFill>
+                  <a:srgbClr val="0070C0"/>
+                </a:solidFill>
+                <a:latin typeface="Tahoma" panose="020B0604030504040204" pitchFamily="34" charset="0"/>
+                <a:cs typeface="Tahoma" panose="020B0604030504040204" pitchFamily="34" charset="0"/>
+              </a:rPr>
+              <a:t>lỗi</a:t>
+            </a:r>
+            <a:r>
+              <a:rPr lang="en-US" sz="2000" dirty="0" smtClean="0">
+                <a:solidFill>
+                  <a:srgbClr val="0070C0"/>
+                </a:solidFill>
+                <a:latin typeface="Tahoma" panose="020B0604030504040204" pitchFamily="34" charset="0"/>
+                <a:cs typeface="Tahoma" panose="020B0604030504040204" pitchFamily="34" charset="0"/>
+              </a:rPr>
+              <a:t>, </a:t>
+            </a:r>
+            <a:r>
+              <a:rPr lang="en-US" sz="2000" dirty="0" err="1" smtClean="0">
+                <a:solidFill>
+                  <a:srgbClr val="0070C0"/>
+                </a:solidFill>
+                <a:latin typeface="Tahoma" panose="020B0604030504040204" pitchFamily="34" charset="0"/>
+                <a:cs typeface="Tahoma" panose="020B0604030504040204" pitchFamily="34" charset="0"/>
+              </a:rPr>
+              <a:t>dễ</a:t>
+            </a:r>
+            <a:r>
+              <a:rPr lang="en-US" sz="2000" dirty="0" smtClean="0">
+                <a:solidFill>
+                  <a:srgbClr val="0070C0"/>
+                </a:solidFill>
+                <a:latin typeface="Tahoma" panose="020B0604030504040204" pitchFamily="34" charset="0"/>
+                <a:cs typeface="Tahoma" panose="020B0604030504040204" pitchFamily="34" charset="0"/>
+              </a:rPr>
+              <a:t> </a:t>
+            </a:r>
+            <a:r>
+              <a:rPr lang="en-US" sz="2000" dirty="0" err="1" smtClean="0">
+                <a:solidFill>
+                  <a:srgbClr val="0070C0"/>
+                </a:solidFill>
+                <a:latin typeface="Tahoma" panose="020B0604030504040204" pitchFamily="34" charset="0"/>
+                <a:cs typeface="Tahoma" panose="020B0604030504040204" pitchFamily="34" charset="0"/>
+              </a:rPr>
+              <a:t>thay</a:t>
+            </a:r>
+            <a:r>
+              <a:rPr lang="en-US" sz="2000" dirty="0" smtClean="0">
+                <a:solidFill>
+                  <a:srgbClr val="0070C0"/>
+                </a:solidFill>
+                <a:latin typeface="Tahoma" panose="020B0604030504040204" pitchFamily="34" charset="0"/>
+                <a:cs typeface="Tahoma" panose="020B0604030504040204" pitchFamily="34" charset="0"/>
+              </a:rPr>
+              <a:t> </a:t>
+            </a:r>
+            <a:r>
+              <a:rPr lang="en-US" sz="2000" dirty="0" err="1" smtClean="0">
+                <a:solidFill>
+                  <a:srgbClr val="0070C0"/>
+                </a:solidFill>
+                <a:latin typeface="Tahoma" panose="020B0604030504040204" pitchFamily="34" charset="0"/>
+                <a:cs typeface="Tahoma" panose="020B0604030504040204" pitchFamily="34" charset="0"/>
+              </a:rPr>
+              <a:t>đổi</a:t>
+            </a:r>
+            <a:r>
+              <a:rPr lang="en-US" sz="2000" dirty="0" smtClean="0">
+                <a:solidFill>
+                  <a:srgbClr val="0070C0"/>
+                </a:solidFill>
+                <a:latin typeface="Tahoma" panose="020B0604030504040204" pitchFamily="34" charset="0"/>
+                <a:cs typeface="Tahoma" panose="020B0604030504040204" pitchFamily="34" charset="0"/>
+              </a:rPr>
+              <a:t>, </a:t>
+            </a:r>
+            <a:r>
+              <a:rPr lang="en-US" sz="2000" dirty="0" err="1" smtClean="0">
+                <a:solidFill>
+                  <a:srgbClr val="0070C0"/>
+                </a:solidFill>
+                <a:latin typeface="Tahoma" panose="020B0604030504040204" pitchFamily="34" charset="0"/>
+                <a:cs typeface="Tahoma" panose="020B0604030504040204" pitchFamily="34" charset="0"/>
+              </a:rPr>
+              <a:t>nâng</a:t>
+            </a:r>
+            <a:r>
+              <a:rPr lang="en-US" sz="2000" dirty="0" smtClean="0">
+                <a:solidFill>
+                  <a:srgbClr val="0070C0"/>
+                </a:solidFill>
+                <a:latin typeface="Tahoma" panose="020B0604030504040204" pitchFamily="34" charset="0"/>
+                <a:cs typeface="Tahoma" panose="020B0604030504040204" pitchFamily="34" charset="0"/>
+              </a:rPr>
+              <a:t> </a:t>
+            </a:r>
+            <a:r>
+              <a:rPr lang="en-US" sz="2000" dirty="0" err="1" smtClean="0">
+                <a:solidFill>
+                  <a:srgbClr val="0070C0"/>
+                </a:solidFill>
+                <a:latin typeface="Tahoma" panose="020B0604030504040204" pitchFamily="34" charset="0"/>
+                <a:cs typeface="Tahoma" panose="020B0604030504040204" pitchFamily="34" charset="0"/>
+              </a:rPr>
+              <a:t>cấp</a:t>
+            </a:r>
+            <a:r>
+              <a:rPr lang="en-US" sz="2000" dirty="0" smtClean="0">
+                <a:solidFill>
+                  <a:srgbClr val="0070C0"/>
+                </a:solidFill>
+                <a:latin typeface="Tahoma" panose="020B0604030504040204" pitchFamily="34" charset="0"/>
+                <a:cs typeface="Tahoma" panose="020B0604030504040204" pitchFamily="34" charset="0"/>
+              </a:rPr>
+              <a:t> </a:t>
+            </a:r>
+            <a:r>
+              <a:rPr lang="en-US" sz="2000" dirty="0" err="1" smtClean="0">
+                <a:solidFill>
+                  <a:srgbClr val="0070C0"/>
+                </a:solidFill>
+                <a:latin typeface="Tahoma" panose="020B0604030504040204" pitchFamily="34" charset="0"/>
+                <a:cs typeface="Tahoma" panose="020B0604030504040204" pitchFamily="34" charset="0"/>
+              </a:rPr>
+              <a:t>hơn</a:t>
+            </a:r>
+            <a:r>
+              <a:rPr lang="en-US" sz="2000" dirty="0" smtClean="0">
+                <a:solidFill>
+                  <a:srgbClr val="0070C0"/>
+                </a:solidFill>
+                <a:latin typeface="Tahoma" panose="020B0604030504040204" pitchFamily="34" charset="0"/>
+                <a:cs typeface="Tahoma" panose="020B0604030504040204" pitchFamily="34" charset="0"/>
+              </a:rPr>
+              <a:t>.</a:t>
+            </a:r>
+          </a:p>
+          <a:p>
+            <a:r>
+              <a:rPr lang="en-US" sz="2000" dirty="0" err="1" smtClean="0">
+                <a:solidFill>
+                  <a:srgbClr val="0070C0"/>
+                </a:solidFill>
+                <a:latin typeface="Tahoma" panose="020B0604030504040204" pitchFamily="34" charset="0"/>
+                <a:cs typeface="Tahoma" panose="020B0604030504040204" pitchFamily="34" charset="0"/>
+              </a:rPr>
+              <a:t>Có</a:t>
+            </a:r>
+            <a:r>
+              <a:rPr lang="en-US" sz="2000" dirty="0" smtClean="0">
+                <a:solidFill>
+                  <a:srgbClr val="0070C0"/>
+                </a:solidFill>
+                <a:latin typeface="Tahoma" panose="020B0604030504040204" pitchFamily="34" charset="0"/>
+                <a:cs typeface="Tahoma" panose="020B0604030504040204" pitchFamily="34" charset="0"/>
+              </a:rPr>
+              <a:t> </a:t>
+            </a:r>
+            <a:r>
+              <a:rPr lang="en-US" sz="2000" dirty="0" err="1" smtClean="0">
+                <a:solidFill>
+                  <a:srgbClr val="0070C0"/>
+                </a:solidFill>
+                <a:latin typeface="Tahoma" panose="020B0604030504040204" pitchFamily="34" charset="0"/>
+                <a:cs typeface="Tahoma" panose="020B0604030504040204" pitchFamily="34" charset="0"/>
+              </a:rPr>
+              <a:t>tính</a:t>
+            </a:r>
+            <a:r>
+              <a:rPr lang="en-US" sz="2000" dirty="0" smtClean="0">
+                <a:solidFill>
+                  <a:srgbClr val="0070C0"/>
+                </a:solidFill>
+                <a:latin typeface="Tahoma" panose="020B0604030504040204" pitchFamily="34" charset="0"/>
+                <a:cs typeface="Tahoma" panose="020B0604030504040204" pitchFamily="34" charset="0"/>
+              </a:rPr>
+              <a:t> </a:t>
+            </a:r>
+            <a:r>
+              <a:rPr lang="en-US" sz="2000" dirty="0" err="1" smtClean="0">
+                <a:solidFill>
+                  <a:srgbClr val="0070C0"/>
+                </a:solidFill>
+                <a:latin typeface="Tahoma" panose="020B0604030504040204" pitchFamily="34" charset="0"/>
+                <a:cs typeface="Tahoma" panose="020B0604030504040204" pitchFamily="34" charset="0"/>
+              </a:rPr>
+              <a:t>bảo</a:t>
+            </a:r>
+            <a:r>
+              <a:rPr lang="en-US" sz="2000" dirty="0" smtClean="0">
+                <a:solidFill>
+                  <a:srgbClr val="0070C0"/>
+                </a:solidFill>
+                <a:latin typeface="Tahoma" panose="020B0604030504040204" pitchFamily="34" charset="0"/>
+                <a:cs typeface="Tahoma" panose="020B0604030504040204" pitchFamily="34" charset="0"/>
+              </a:rPr>
+              <a:t> </a:t>
+            </a:r>
+            <a:r>
+              <a:rPr lang="en-US" sz="2000" dirty="0" err="1" smtClean="0">
+                <a:solidFill>
+                  <a:srgbClr val="0070C0"/>
+                </a:solidFill>
+                <a:latin typeface="Tahoma" panose="020B0604030504040204" pitchFamily="34" charset="0"/>
+                <a:cs typeface="Tahoma" panose="020B0604030504040204" pitchFamily="34" charset="0"/>
+              </a:rPr>
+              <a:t>mật</a:t>
+            </a:r>
+            <a:r>
+              <a:rPr lang="en-US" sz="2000" dirty="0" smtClean="0">
+                <a:solidFill>
+                  <a:srgbClr val="0070C0"/>
+                </a:solidFill>
+                <a:latin typeface="Tahoma" panose="020B0604030504040204" pitchFamily="34" charset="0"/>
+                <a:cs typeface="Tahoma" panose="020B0604030504040204" pitchFamily="34" charset="0"/>
+              </a:rPr>
+              <a:t> </a:t>
+            </a:r>
+            <a:r>
+              <a:rPr lang="en-US" sz="2000" dirty="0" err="1" smtClean="0">
+                <a:solidFill>
+                  <a:srgbClr val="0070C0"/>
+                </a:solidFill>
+                <a:latin typeface="Tahoma" panose="020B0604030504040204" pitchFamily="34" charset="0"/>
+                <a:cs typeface="Tahoma" panose="020B0604030504040204" pitchFamily="34" charset="0"/>
+              </a:rPr>
+              <a:t>cao</a:t>
+            </a:r>
+            <a:r>
+              <a:rPr lang="en-US" sz="2000" dirty="0" smtClean="0">
+                <a:solidFill>
+                  <a:srgbClr val="0070C0"/>
+                </a:solidFill>
+                <a:latin typeface="Tahoma" panose="020B0604030504040204" pitchFamily="34" charset="0"/>
+                <a:cs typeface="Tahoma" panose="020B0604030504040204" pitchFamily="34" charset="0"/>
+              </a:rPr>
+              <a:t> </a:t>
+            </a:r>
+            <a:r>
+              <a:rPr lang="en-US" sz="2000" dirty="0" err="1" smtClean="0">
+                <a:solidFill>
+                  <a:srgbClr val="0070C0"/>
+                </a:solidFill>
+                <a:latin typeface="Tahoma" panose="020B0604030504040204" pitchFamily="34" charset="0"/>
+                <a:cs typeface="Tahoma" panose="020B0604030504040204" pitchFamily="34" charset="0"/>
+              </a:rPr>
+              <a:t>hơn</a:t>
+            </a:r>
+            <a:r>
+              <a:rPr lang="en-US" sz="2000" dirty="0" smtClean="0">
+                <a:solidFill>
+                  <a:srgbClr val="0070C0"/>
+                </a:solidFill>
+                <a:latin typeface="Tahoma" panose="020B0604030504040204" pitchFamily="34" charset="0"/>
+                <a:cs typeface="Tahoma" panose="020B0604030504040204" pitchFamily="34" charset="0"/>
+              </a:rPr>
+              <a:t>.</a:t>
+            </a:r>
+            <a:endParaRPr lang="en-US" sz="2000" dirty="0">
+              <a:solidFill>
+                <a:srgbClr val="0070C0"/>
+              </a:solidFill>
+              <a:latin typeface="Tahoma" panose="020B0604030504040204" pitchFamily="34" charset="0"/>
+              <a:cs typeface="Tahoma" panose="020B0604030504040204" pitchFamily="34" charset="0"/>
+            </a:endParaRPr>
+          </a:p>
+        </p:txBody>
+      </p:sp>
+      <p:sp>
+        <p:nvSpPr>
+          <p:cNvPr id="4" name="Slide Number Placeholder 3"/>
+          <p:cNvSpPr>
+            <a:spLocks noGrp="1"/>
+          </p:cNvSpPr>
+          <p:nvPr>
+            <p:ph type="sldNum" sz="quarter" idx="12"/>
+          </p:nvPr>
+        </p:nvSpPr>
+        <p:spPr/>
+        <p:txBody>
+          <a:bodyPr/>
+          <a:lstStyle/>
+          <a:p>
+            <a:fld id="{D57F1E4F-1CFF-5643-939E-217C01CDF565}" type="slidenum">
+              <a:rPr lang="en-US" smtClean="0"/>
+              <a:pPr/>
+              <a:t>8</a:t>
+            </a:fld>
+            <a:endParaRPr lang="en-US" dirty="0"/>
+          </a:p>
+        </p:txBody>
+      </p:sp>
+    </p:spTree>
+    <p:extLst>
+      <p:ext uri="{BB962C8B-B14F-4D97-AF65-F5344CB8AC3E}">
+        <p14:creationId xmlns:p14="http://schemas.microsoft.com/office/powerpoint/2010/main" val="38030069"/>
+      </p:ext>
+    </p:extLst>
+  </p:cSld>
+  <p:clrMapOvr>
+    <a:masterClrMapping/>
+  </p:clrMapOvr>
+</p:sld>
+</file>
+
+<file path=ppt/slides/slide9.xml><?xml version="1.0" encoding="utf-8"?>
+<p:sld xmlns:a="http://schemas.openxmlformats.org/drawingml/2006/main" xmlns:r="http://schemas.openxmlformats.org/officeDocument/2006/relationships" xmlns:p="http://schemas.openxmlformats.org/presentationml/2006/main">
+  <p:cSld>
+    <p:spTree>
+      <p:nvGrpSpPr>
+        <p:cNvPr id="1" name=""/>
+        <p:cNvGrpSpPr/>
+        <p:nvPr/>
+      </p:nvGrpSpPr>
+      <p:grpSpPr>
+        <a:xfrm>
+          <a:off x="0" y="0"/>
+          <a:ext cx="0" cy="0"/>
+          <a:chOff x="0" y="0"/>
+          <a:chExt cx="0" cy="0"/>
+        </a:xfrm>
+      </p:grpSpPr>
+      <p:sp>
+        <p:nvSpPr>
+          <p:cNvPr id="2" name="Title 1"/>
+          <p:cNvSpPr>
+            <a:spLocks noGrp="1"/>
+          </p:cNvSpPr>
+          <p:nvPr>
+            <p:ph type="title"/>
+          </p:nvPr>
+        </p:nvSpPr>
+        <p:spPr/>
+        <p:txBody>
+          <a:bodyPr>
+            <a:normAutofit/>
+          </a:bodyPr>
+          <a:lstStyle/>
+          <a:p>
+            <a:r>
+              <a:rPr lang="en-US" sz="6000" dirty="0"/>
+              <a:t>Functions and Side effect</a:t>
+            </a:r>
+          </a:p>
+        </p:txBody>
+      </p:sp>
+      <p:sp>
+        <p:nvSpPr>
+          <p:cNvPr id="3" name="Content Placeholder 2"/>
+          <p:cNvSpPr>
+            <a:spLocks noGrp="1"/>
+          </p:cNvSpPr>
+          <p:nvPr>
+            <p:ph idx="1"/>
+          </p:nvPr>
+        </p:nvSpPr>
+        <p:spPr/>
+        <p:txBody>
+          <a:bodyPr>
+            <a:normAutofit/>
+          </a:bodyPr>
+          <a:lstStyle/>
+          <a:p>
+            <a:pPr>
+              <a:lnSpc>
+                <a:spcPct val="200000"/>
+              </a:lnSpc>
+            </a:pPr>
+            <a:r>
+              <a:rPr lang="en-US" sz="2000" dirty="0">
+                <a:solidFill>
+                  <a:srgbClr val="0070C0"/>
+                </a:solidFill>
+                <a:latin typeface="Tahoma" panose="020B0604030504040204" pitchFamily="34" charset="0"/>
+                <a:cs typeface="Tahoma" panose="020B0604030504040204" pitchFamily="34" charset="0"/>
+              </a:rPr>
+              <a:t>Side </a:t>
+            </a:r>
+            <a:r>
+              <a:rPr lang="en-US" sz="2000" dirty="0" smtClean="0">
+                <a:solidFill>
+                  <a:srgbClr val="0070C0"/>
+                </a:solidFill>
+                <a:latin typeface="Tahoma" panose="020B0604030504040204" pitchFamily="34" charset="0"/>
+                <a:cs typeface="Tahoma" panose="020B0604030504040204" pitchFamily="34" charset="0"/>
+              </a:rPr>
+              <a:t>effect : </a:t>
+            </a:r>
+            <a:r>
+              <a:rPr lang="en-US" sz="2000" dirty="0" err="1" smtClean="0">
+                <a:solidFill>
+                  <a:srgbClr val="0070C0"/>
+                </a:solidFill>
+                <a:latin typeface="Tahoma" panose="020B0604030504040204" pitchFamily="34" charset="0"/>
+                <a:cs typeface="Tahoma" panose="020B0604030504040204" pitchFamily="34" charset="0"/>
+              </a:rPr>
+              <a:t>là</a:t>
+            </a:r>
+            <a:r>
+              <a:rPr lang="en-US" sz="2000" dirty="0" smtClean="0">
+                <a:solidFill>
+                  <a:srgbClr val="0070C0"/>
+                </a:solidFill>
+                <a:latin typeface="Tahoma" panose="020B0604030504040204" pitchFamily="34" charset="0"/>
+                <a:cs typeface="Tahoma" panose="020B0604030504040204" pitchFamily="34" charset="0"/>
+              </a:rPr>
+              <a:t> </a:t>
+            </a:r>
+            <a:r>
+              <a:rPr lang="en-US" sz="2000" dirty="0" err="1" smtClean="0">
+                <a:solidFill>
+                  <a:srgbClr val="0070C0"/>
+                </a:solidFill>
+                <a:latin typeface="Tahoma" panose="020B0604030504040204" pitchFamily="34" charset="0"/>
+                <a:cs typeface="Tahoma" panose="020B0604030504040204" pitchFamily="34" charset="0"/>
+              </a:rPr>
+              <a:t>các</a:t>
+            </a:r>
+            <a:r>
+              <a:rPr lang="en-US" sz="2000" dirty="0" smtClean="0">
+                <a:solidFill>
+                  <a:srgbClr val="0070C0"/>
+                </a:solidFill>
+                <a:latin typeface="Tahoma" panose="020B0604030504040204" pitchFamily="34" charset="0"/>
+                <a:cs typeface="Tahoma" panose="020B0604030504040204" pitchFamily="34" charset="0"/>
+              </a:rPr>
+              <a:t> </a:t>
+            </a:r>
+            <a:r>
+              <a:rPr lang="en-US" sz="2000" dirty="0" err="1" smtClean="0">
+                <a:solidFill>
+                  <a:srgbClr val="0070C0"/>
+                </a:solidFill>
+                <a:latin typeface="Tahoma" panose="020B0604030504040204" pitchFamily="34" charset="0"/>
+                <a:cs typeface="Tahoma" panose="020B0604030504040204" pitchFamily="34" charset="0"/>
+              </a:rPr>
+              <a:t>điều</a:t>
+            </a:r>
+            <a:r>
+              <a:rPr lang="en-US" sz="2000" dirty="0" smtClean="0">
+                <a:solidFill>
+                  <a:srgbClr val="0070C0"/>
+                </a:solidFill>
+                <a:latin typeface="Tahoma" panose="020B0604030504040204" pitchFamily="34" charset="0"/>
+                <a:cs typeface="Tahoma" panose="020B0604030504040204" pitchFamily="34" charset="0"/>
+              </a:rPr>
+              <a:t> </a:t>
+            </a:r>
+            <a:r>
+              <a:rPr lang="en-US" sz="2000" dirty="0" err="1" smtClean="0">
+                <a:solidFill>
+                  <a:srgbClr val="0070C0"/>
+                </a:solidFill>
+                <a:latin typeface="Tahoma" panose="020B0604030504040204" pitchFamily="34" charset="0"/>
+                <a:cs typeface="Tahoma" panose="020B0604030504040204" pitchFamily="34" charset="0"/>
+              </a:rPr>
+              <a:t>không</a:t>
+            </a:r>
+            <a:r>
+              <a:rPr lang="en-US" sz="2000" dirty="0" smtClean="0">
+                <a:solidFill>
+                  <a:srgbClr val="0070C0"/>
+                </a:solidFill>
+                <a:latin typeface="Tahoma" panose="020B0604030504040204" pitchFamily="34" charset="0"/>
+                <a:cs typeface="Tahoma" panose="020B0604030504040204" pitchFamily="34" charset="0"/>
+              </a:rPr>
+              <a:t> </a:t>
+            </a:r>
+            <a:r>
+              <a:rPr lang="en-US" sz="2000" dirty="0" err="1" smtClean="0">
+                <a:solidFill>
+                  <a:srgbClr val="0070C0"/>
+                </a:solidFill>
+                <a:latin typeface="Tahoma" panose="020B0604030504040204" pitchFamily="34" charset="0"/>
+                <a:cs typeface="Tahoma" panose="020B0604030504040204" pitchFamily="34" charset="0"/>
+              </a:rPr>
+              <a:t>mong</a:t>
+            </a:r>
+            <a:r>
+              <a:rPr lang="en-US" sz="2000" dirty="0" smtClean="0">
+                <a:solidFill>
+                  <a:srgbClr val="0070C0"/>
+                </a:solidFill>
+                <a:latin typeface="Tahoma" panose="020B0604030504040204" pitchFamily="34" charset="0"/>
+                <a:cs typeface="Tahoma" panose="020B0604030504040204" pitchFamily="34" charset="0"/>
+              </a:rPr>
+              <a:t> </a:t>
+            </a:r>
+            <a:r>
+              <a:rPr lang="en-US" sz="2000" dirty="0" err="1" smtClean="0">
+                <a:solidFill>
+                  <a:srgbClr val="0070C0"/>
+                </a:solidFill>
+                <a:latin typeface="Tahoma" panose="020B0604030504040204" pitchFamily="34" charset="0"/>
+                <a:cs typeface="Tahoma" panose="020B0604030504040204" pitchFamily="34" charset="0"/>
+              </a:rPr>
+              <a:t>muốn</a:t>
+            </a:r>
+            <a:r>
+              <a:rPr lang="en-US" sz="2000" dirty="0" smtClean="0">
+                <a:solidFill>
+                  <a:srgbClr val="0070C0"/>
+                </a:solidFill>
+                <a:latin typeface="Tahoma" panose="020B0604030504040204" pitchFamily="34" charset="0"/>
+                <a:cs typeface="Tahoma" panose="020B0604030504040204" pitchFamily="34" charset="0"/>
+              </a:rPr>
+              <a:t> </a:t>
+            </a:r>
+            <a:r>
+              <a:rPr lang="en-US" sz="2000" dirty="0" err="1" smtClean="0">
+                <a:solidFill>
+                  <a:srgbClr val="0070C0"/>
+                </a:solidFill>
+                <a:latin typeface="Tahoma" panose="020B0604030504040204" pitchFamily="34" charset="0"/>
+                <a:cs typeface="Tahoma" panose="020B0604030504040204" pitchFamily="34" charset="0"/>
+              </a:rPr>
+              <a:t>nhưng</a:t>
+            </a:r>
+            <a:r>
+              <a:rPr lang="en-US" sz="2000" dirty="0" smtClean="0">
+                <a:solidFill>
+                  <a:srgbClr val="0070C0"/>
+                </a:solidFill>
+                <a:latin typeface="Tahoma" panose="020B0604030504040204" pitchFamily="34" charset="0"/>
+                <a:cs typeface="Tahoma" panose="020B0604030504040204" pitchFamily="34" charset="0"/>
+              </a:rPr>
+              <a:t> </a:t>
+            </a:r>
+            <a:r>
+              <a:rPr lang="en-US" sz="2000" dirty="0" err="1" smtClean="0">
+                <a:solidFill>
+                  <a:srgbClr val="0070C0"/>
+                </a:solidFill>
+                <a:latin typeface="Tahoma" panose="020B0604030504040204" pitchFamily="34" charset="0"/>
+                <a:cs typeface="Tahoma" panose="020B0604030504040204" pitchFamily="34" charset="0"/>
+              </a:rPr>
+              <a:t>vẫn</a:t>
+            </a:r>
+            <a:r>
+              <a:rPr lang="en-US" sz="2000" dirty="0" smtClean="0">
+                <a:solidFill>
+                  <a:srgbClr val="0070C0"/>
+                </a:solidFill>
+                <a:latin typeface="Tahoma" panose="020B0604030504040204" pitchFamily="34" charset="0"/>
+                <a:cs typeface="Tahoma" panose="020B0604030504040204" pitchFamily="34" charset="0"/>
+              </a:rPr>
+              <a:t> </a:t>
+            </a:r>
+            <a:r>
+              <a:rPr lang="en-US" sz="2000" dirty="0" err="1" smtClean="0">
+                <a:solidFill>
+                  <a:srgbClr val="0070C0"/>
+                </a:solidFill>
+                <a:latin typeface="Tahoma" panose="020B0604030504040204" pitchFamily="34" charset="0"/>
+                <a:cs typeface="Tahoma" panose="020B0604030504040204" pitchFamily="34" charset="0"/>
+              </a:rPr>
+              <a:t>xảy</a:t>
+            </a:r>
+            <a:r>
+              <a:rPr lang="en-US" sz="2000" dirty="0" smtClean="0">
+                <a:solidFill>
+                  <a:srgbClr val="0070C0"/>
+                </a:solidFill>
+                <a:latin typeface="Tahoma" panose="020B0604030504040204" pitchFamily="34" charset="0"/>
+                <a:cs typeface="Tahoma" panose="020B0604030504040204" pitchFamily="34" charset="0"/>
+              </a:rPr>
+              <a:t> </a:t>
+            </a:r>
+            <a:r>
+              <a:rPr lang="en-US" sz="2000" dirty="0" err="1" smtClean="0">
+                <a:solidFill>
+                  <a:srgbClr val="0070C0"/>
+                </a:solidFill>
+                <a:latin typeface="Tahoma" panose="020B0604030504040204" pitchFamily="34" charset="0"/>
+                <a:cs typeface="Tahoma" panose="020B0604030504040204" pitchFamily="34" charset="0"/>
+              </a:rPr>
+              <a:t>ra</a:t>
+            </a:r>
+            <a:r>
+              <a:rPr lang="en-US" sz="2000" dirty="0" smtClean="0">
+                <a:solidFill>
+                  <a:srgbClr val="0070C0"/>
+                </a:solidFill>
+                <a:latin typeface="Tahoma" panose="020B0604030504040204" pitchFamily="34" charset="0"/>
+                <a:cs typeface="Tahoma" panose="020B0604030504040204" pitchFamily="34" charset="0"/>
+              </a:rPr>
+              <a:t> </a:t>
+            </a:r>
+            <a:r>
+              <a:rPr lang="en-US" sz="2000" dirty="0" err="1" smtClean="0">
+                <a:solidFill>
+                  <a:srgbClr val="0070C0"/>
+                </a:solidFill>
+                <a:latin typeface="Tahoma" panose="020B0604030504040204" pitchFamily="34" charset="0"/>
+                <a:cs typeface="Tahoma" panose="020B0604030504040204" pitchFamily="34" charset="0"/>
+              </a:rPr>
+              <a:t>khi</a:t>
+            </a:r>
+            <a:r>
+              <a:rPr lang="en-US" sz="2000" dirty="0" smtClean="0">
+                <a:solidFill>
+                  <a:srgbClr val="0070C0"/>
+                </a:solidFill>
+                <a:latin typeface="Tahoma" panose="020B0604030504040204" pitchFamily="34" charset="0"/>
+                <a:cs typeface="Tahoma" panose="020B0604030504040204" pitchFamily="34" charset="0"/>
+              </a:rPr>
+              <a:t> ta </a:t>
+            </a:r>
+            <a:r>
+              <a:rPr lang="en-US" sz="2000" dirty="0" err="1" smtClean="0">
+                <a:solidFill>
+                  <a:srgbClr val="0070C0"/>
+                </a:solidFill>
+                <a:latin typeface="Tahoma" panose="020B0604030504040204" pitchFamily="34" charset="0"/>
+                <a:cs typeface="Tahoma" panose="020B0604030504040204" pitchFamily="34" charset="0"/>
+              </a:rPr>
+              <a:t>sử</a:t>
+            </a:r>
+            <a:r>
+              <a:rPr lang="en-US" sz="2000" dirty="0" smtClean="0">
+                <a:solidFill>
+                  <a:srgbClr val="0070C0"/>
+                </a:solidFill>
+                <a:latin typeface="Tahoma" panose="020B0604030504040204" pitchFamily="34" charset="0"/>
+                <a:cs typeface="Tahoma" panose="020B0604030504040204" pitchFamily="34" charset="0"/>
+              </a:rPr>
+              <a:t> </a:t>
+            </a:r>
+            <a:r>
+              <a:rPr lang="en-US" sz="2000" dirty="0" err="1" smtClean="0">
+                <a:solidFill>
+                  <a:srgbClr val="0070C0"/>
+                </a:solidFill>
+                <a:latin typeface="Tahoma" panose="020B0604030504040204" pitchFamily="34" charset="0"/>
+                <a:cs typeface="Tahoma" panose="020B0604030504040204" pitchFamily="34" charset="0"/>
+              </a:rPr>
+              <a:t>dụng</a:t>
+            </a:r>
+            <a:r>
+              <a:rPr lang="en-US" sz="2000" dirty="0" smtClean="0">
+                <a:solidFill>
+                  <a:srgbClr val="0070C0"/>
+                </a:solidFill>
+                <a:latin typeface="Tahoma" panose="020B0604030504040204" pitchFamily="34" charset="0"/>
+                <a:cs typeface="Tahoma" panose="020B0604030504040204" pitchFamily="34" charset="0"/>
+              </a:rPr>
+              <a:t> 1 function.</a:t>
+            </a:r>
+          </a:p>
+          <a:p>
+            <a:pPr>
+              <a:lnSpc>
+                <a:spcPct val="200000"/>
+              </a:lnSpc>
+            </a:pPr>
+            <a:r>
+              <a:rPr lang="en-US" sz="2000" dirty="0" err="1">
+                <a:solidFill>
+                  <a:srgbClr val="0070C0"/>
+                </a:solidFill>
+                <a:latin typeface="Tahoma" panose="020B0604030504040204" pitchFamily="34" charset="0"/>
+                <a:cs typeface="Tahoma" panose="020B0604030504040204" pitchFamily="34" charset="0"/>
+              </a:rPr>
+              <a:t>Hàm</a:t>
+            </a:r>
+            <a:r>
+              <a:rPr lang="en-US" sz="2000" dirty="0">
+                <a:solidFill>
+                  <a:srgbClr val="0070C0"/>
+                </a:solidFill>
+                <a:latin typeface="Tahoma" panose="020B0604030504040204" pitchFamily="34" charset="0"/>
+                <a:cs typeface="Tahoma" panose="020B0604030504040204" pitchFamily="34" charset="0"/>
+              </a:rPr>
+              <a:t> </a:t>
+            </a:r>
+            <a:r>
+              <a:rPr lang="en-US" sz="2000" dirty="0" err="1">
+                <a:solidFill>
+                  <a:srgbClr val="0070C0"/>
+                </a:solidFill>
+                <a:latin typeface="Tahoma" panose="020B0604030504040204" pitchFamily="34" charset="0"/>
+                <a:cs typeface="Tahoma" panose="020B0604030504040204" pitchFamily="34" charset="0"/>
+              </a:rPr>
+              <a:t>thuần</a:t>
+            </a:r>
+            <a:r>
+              <a:rPr lang="en-US" sz="2000" dirty="0">
+                <a:solidFill>
+                  <a:srgbClr val="0070C0"/>
+                </a:solidFill>
+                <a:latin typeface="Tahoma" panose="020B0604030504040204" pitchFamily="34" charset="0"/>
+                <a:cs typeface="Tahoma" panose="020B0604030504040204" pitchFamily="34" charset="0"/>
+              </a:rPr>
+              <a:t> </a:t>
+            </a:r>
+            <a:r>
+              <a:rPr lang="en-US" sz="2000" dirty="0" err="1">
+                <a:solidFill>
+                  <a:srgbClr val="0070C0"/>
+                </a:solidFill>
+                <a:latin typeface="Tahoma" panose="020B0604030504040204" pitchFamily="34" charset="0"/>
+                <a:cs typeface="Tahoma" panose="020B0604030504040204" pitchFamily="34" charset="0"/>
+              </a:rPr>
+              <a:t>túy</a:t>
+            </a:r>
+            <a:r>
+              <a:rPr lang="en-US" sz="2000" dirty="0">
+                <a:solidFill>
+                  <a:srgbClr val="0070C0"/>
+                </a:solidFill>
+                <a:latin typeface="Tahoma" panose="020B0604030504040204" pitchFamily="34" charset="0"/>
+                <a:cs typeface="Tahoma" panose="020B0604030504040204" pitchFamily="34" charset="0"/>
+              </a:rPr>
+              <a:t> </a:t>
+            </a:r>
+            <a:r>
+              <a:rPr lang="en-US" sz="2000" dirty="0" err="1">
+                <a:solidFill>
+                  <a:srgbClr val="0070C0"/>
+                </a:solidFill>
+                <a:latin typeface="Tahoma" panose="020B0604030504040204" pitchFamily="34" charset="0"/>
+                <a:cs typeface="Tahoma" panose="020B0604030504040204" pitchFamily="34" charset="0"/>
+              </a:rPr>
+              <a:t>là</a:t>
+            </a:r>
+            <a:r>
+              <a:rPr lang="en-US" sz="2000" dirty="0">
+                <a:solidFill>
+                  <a:srgbClr val="0070C0"/>
+                </a:solidFill>
+                <a:latin typeface="Tahoma" panose="020B0604030504040204" pitchFamily="34" charset="0"/>
+                <a:cs typeface="Tahoma" panose="020B0604030504040204" pitchFamily="34" charset="0"/>
+              </a:rPr>
+              <a:t> </a:t>
+            </a:r>
+            <a:r>
+              <a:rPr lang="en-US" sz="2000" dirty="0" err="1">
+                <a:solidFill>
+                  <a:srgbClr val="0070C0"/>
+                </a:solidFill>
+                <a:latin typeface="Tahoma" panose="020B0604030504040204" pitchFamily="34" charset="0"/>
+                <a:cs typeface="Tahoma" panose="020B0604030504040204" pitchFamily="34" charset="0"/>
+              </a:rPr>
+              <a:t>một</a:t>
+            </a:r>
+            <a:r>
+              <a:rPr lang="en-US" sz="2000" dirty="0">
+                <a:solidFill>
+                  <a:srgbClr val="0070C0"/>
+                </a:solidFill>
+                <a:latin typeface="Tahoma" panose="020B0604030504040204" pitchFamily="34" charset="0"/>
+                <a:cs typeface="Tahoma" panose="020B0604030504040204" pitchFamily="34" charset="0"/>
+              </a:rPr>
+              <a:t> </a:t>
+            </a:r>
+            <a:r>
+              <a:rPr lang="en-US" sz="2000" dirty="0" err="1">
+                <a:solidFill>
+                  <a:srgbClr val="0070C0"/>
+                </a:solidFill>
+                <a:latin typeface="Tahoma" panose="020B0604030504040204" pitchFamily="34" charset="0"/>
+                <a:cs typeface="Tahoma" panose="020B0604030504040204" pitchFamily="34" charset="0"/>
+              </a:rPr>
+              <a:t>loại</a:t>
+            </a:r>
+            <a:r>
+              <a:rPr lang="en-US" sz="2000" dirty="0">
+                <a:solidFill>
+                  <a:srgbClr val="0070C0"/>
+                </a:solidFill>
+                <a:latin typeface="Tahoma" panose="020B0604030504040204" pitchFamily="34" charset="0"/>
+                <a:cs typeface="Tahoma" panose="020B0604030504040204" pitchFamily="34" charset="0"/>
+              </a:rPr>
+              <a:t> </a:t>
+            </a:r>
+            <a:r>
+              <a:rPr lang="en-US" sz="2000" dirty="0" err="1">
+                <a:solidFill>
+                  <a:srgbClr val="0070C0"/>
+                </a:solidFill>
+                <a:latin typeface="Tahoma" panose="020B0604030504040204" pitchFamily="34" charset="0"/>
+                <a:cs typeface="Tahoma" panose="020B0604030504040204" pitchFamily="34" charset="0"/>
+              </a:rPr>
+              <a:t>hàm</a:t>
+            </a:r>
+            <a:r>
+              <a:rPr lang="en-US" sz="2000" dirty="0">
+                <a:solidFill>
+                  <a:srgbClr val="0070C0"/>
+                </a:solidFill>
+                <a:latin typeface="Tahoma" panose="020B0604030504040204" pitchFamily="34" charset="0"/>
+                <a:cs typeface="Tahoma" panose="020B0604030504040204" pitchFamily="34" charset="0"/>
+              </a:rPr>
+              <a:t> </a:t>
+            </a:r>
+            <a:r>
+              <a:rPr lang="en-US" sz="2000" dirty="0" err="1">
+                <a:solidFill>
+                  <a:srgbClr val="0070C0"/>
+                </a:solidFill>
+                <a:latin typeface="Tahoma" panose="020B0604030504040204" pitchFamily="34" charset="0"/>
+                <a:cs typeface="Tahoma" panose="020B0604030504040204" pitchFamily="34" charset="0"/>
+              </a:rPr>
+              <a:t>tạo</a:t>
+            </a:r>
+            <a:r>
+              <a:rPr lang="en-US" sz="2000" dirty="0">
+                <a:solidFill>
+                  <a:srgbClr val="0070C0"/>
+                </a:solidFill>
+                <a:latin typeface="Tahoma" panose="020B0604030504040204" pitchFamily="34" charset="0"/>
+                <a:cs typeface="Tahoma" panose="020B0604030504040204" pitchFamily="34" charset="0"/>
+              </a:rPr>
+              <a:t> </a:t>
+            </a:r>
+            <a:r>
+              <a:rPr lang="en-US" sz="2000" dirty="0" err="1">
+                <a:solidFill>
+                  <a:srgbClr val="0070C0"/>
+                </a:solidFill>
+                <a:latin typeface="Tahoma" panose="020B0604030504040204" pitchFamily="34" charset="0"/>
+                <a:cs typeface="Tahoma" panose="020B0604030504040204" pitchFamily="34" charset="0"/>
+              </a:rPr>
+              <a:t>giá</a:t>
+            </a:r>
+            <a:r>
+              <a:rPr lang="en-US" sz="2000" dirty="0">
+                <a:solidFill>
+                  <a:srgbClr val="0070C0"/>
+                </a:solidFill>
+                <a:latin typeface="Tahoma" panose="020B0604030504040204" pitchFamily="34" charset="0"/>
+                <a:cs typeface="Tahoma" panose="020B0604030504040204" pitchFamily="34" charset="0"/>
+              </a:rPr>
+              <a:t> </a:t>
+            </a:r>
+            <a:r>
+              <a:rPr lang="en-US" sz="2000" dirty="0" err="1">
+                <a:solidFill>
+                  <a:srgbClr val="0070C0"/>
+                </a:solidFill>
+                <a:latin typeface="Tahoma" panose="020B0604030504040204" pitchFamily="34" charset="0"/>
+                <a:cs typeface="Tahoma" panose="020B0604030504040204" pitchFamily="34" charset="0"/>
+              </a:rPr>
+              <a:t>trị</a:t>
+            </a:r>
+            <a:r>
+              <a:rPr lang="en-US" sz="2000" dirty="0">
+                <a:solidFill>
+                  <a:srgbClr val="0070C0"/>
+                </a:solidFill>
+                <a:latin typeface="Tahoma" panose="020B0604030504040204" pitchFamily="34" charset="0"/>
+                <a:cs typeface="Tahoma" panose="020B0604030504040204" pitchFamily="34" charset="0"/>
+              </a:rPr>
+              <a:t> </a:t>
+            </a:r>
+            <a:r>
+              <a:rPr lang="en-US" sz="2000" dirty="0" err="1">
+                <a:solidFill>
+                  <a:srgbClr val="0070C0"/>
+                </a:solidFill>
+                <a:latin typeface="Tahoma" panose="020B0604030504040204" pitchFamily="34" charset="0"/>
+                <a:cs typeface="Tahoma" panose="020B0604030504040204" pitchFamily="34" charset="0"/>
+              </a:rPr>
+              <a:t>cụ</a:t>
+            </a:r>
+            <a:r>
+              <a:rPr lang="en-US" sz="2000" dirty="0">
+                <a:solidFill>
+                  <a:srgbClr val="0070C0"/>
+                </a:solidFill>
+                <a:latin typeface="Tahoma" panose="020B0604030504040204" pitchFamily="34" charset="0"/>
+                <a:cs typeface="Tahoma" panose="020B0604030504040204" pitchFamily="34" charset="0"/>
+              </a:rPr>
+              <a:t> </a:t>
+            </a:r>
+            <a:r>
+              <a:rPr lang="en-US" sz="2000" dirty="0" err="1">
+                <a:solidFill>
+                  <a:srgbClr val="0070C0"/>
+                </a:solidFill>
+                <a:latin typeface="Tahoma" panose="020B0604030504040204" pitchFamily="34" charset="0"/>
+                <a:cs typeface="Tahoma" panose="020B0604030504040204" pitchFamily="34" charset="0"/>
+              </a:rPr>
+              <a:t>thể</a:t>
+            </a:r>
+            <a:r>
+              <a:rPr lang="en-US" sz="2000" dirty="0">
+                <a:solidFill>
+                  <a:srgbClr val="0070C0"/>
+                </a:solidFill>
+                <a:latin typeface="Tahoma" panose="020B0604030504040204" pitchFamily="34" charset="0"/>
+                <a:cs typeface="Tahoma" panose="020B0604030504040204" pitchFamily="34" charset="0"/>
+              </a:rPr>
+              <a:t> </a:t>
+            </a:r>
+            <a:r>
+              <a:rPr lang="en-US" sz="2000" dirty="0" err="1">
+                <a:solidFill>
+                  <a:srgbClr val="0070C0"/>
+                </a:solidFill>
+                <a:latin typeface="Tahoma" panose="020B0604030504040204" pitchFamily="34" charset="0"/>
+                <a:cs typeface="Tahoma" panose="020B0604030504040204" pitchFamily="34" charset="0"/>
+              </a:rPr>
+              <a:t>không</a:t>
+            </a:r>
+            <a:r>
+              <a:rPr lang="en-US" sz="2000" dirty="0">
+                <a:solidFill>
+                  <a:srgbClr val="0070C0"/>
+                </a:solidFill>
+                <a:latin typeface="Tahoma" panose="020B0604030504040204" pitchFamily="34" charset="0"/>
+                <a:cs typeface="Tahoma" panose="020B0604030504040204" pitchFamily="34" charset="0"/>
+              </a:rPr>
+              <a:t> </a:t>
+            </a:r>
+            <a:r>
+              <a:rPr lang="en-US" sz="2000" dirty="0" err="1">
+                <a:solidFill>
+                  <a:srgbClr val="0070C0"/>
+                </a:solidFill>
+                <a:latin typeface="Tahoma" panose="020B0604030504040204" pitchFamily="34" charset="0"/>
+                <a:cs typeface="Tahoma" panose="020B0604030504040204" pitchFamily="34" charset="0"/>
+              </a:rPr>
+              <a:t>chỉ</a:t>
+            </a:r>
+            <a:r>
+              <a:rPr lang="en-US" sz="2000" dirty="0">
+                <a:solidFill>
+                  <a:srgbClr val="0070C0"/>
+                </a:solidFill>
+                <a:latin typeface="Tahoma" panose="020B0604030504040204" pitchFamily="34" charset="0"/>
+                <a:cs typeface="Tahoma" panose="020B0604030504040204" pitchFamily="34" charset="0"/>
+              </a:rPr>
+              <a:t> </a:t>
+            </a:r>
+            <a:r>
+              <a:rPr lang="en-US" sz="2000" dirty="0" err="1">
+                <a:solidFill>
+                  <a:srgbClr val="0070C0"/>
+                </a:solidFill>
+                <a:latin typeface="Tahoma" panose="020B0604030504040204" pitchFamily="34" charset="0"/>
+                <a:cs typeface="Tahoma" panose="020B0604030504040204" pitchFamily="34" charset="0"/>
+              </a:rPr>
+              <a:t>không</a:t>
+            </a:r>
+            <a:r>
+              <a:rPr lang="en-US" sz="2000" dirty="0">
+                <a:solidFill>
+                  <a:srgbClr val="0070C0"/>
+                </a:solidFill>
+                <a:latin typeface="Tahoma" panose="020B0604030504040204" pitchFamily="34" charset="0"/>
+                <a:cs typeface="Tahoma" panose="020B0604030504040204" pitchFamily="34" charset="0"/>
+              </a:rPr>
+              <a:t> </a:t>
+            </a:r>
+            <a:r>
+              <a:rPr lang="en-US" sz="2000" dirty="0" err="1">
+                <a:solidFill>
+                  <a:srgbClr val="0070C0"/>
+                </a:solidFill>
+                <a:latin typeface="Tahoma" panose="020B0604030504040204" pitchFamily="34" charset="0"/>
+                <a:cs typeface="Tahoma" panose="020B0604030504040204" pitchFamily="34" charset="0"/>
+              </a:rPr>
+              <a:t>có</a:t>
+            </a:r>
+            <a:r>
+              <a:rPr lang="en-US" sz="2000" dirty="0">
+                <a:solidFill>
+                  <a:srgbClr val="0070C0"/>
+                </a:solidFill>
+                <a:latin typeface="Tahoma" panose="020B0604030504040204" pitchFamily="34" charset="0"/>
+                <a:cs typeface="Tahoma" panose="020B0604030504040204" pitchFamily="34" charset="0"/>
+              </a:rPr>
+              <a:t> </a:t>
+            </a:r>
+            <a:r>
+              <a:rPr lang="en-US" sz="2000" dirty="0" err="1">
+                <a:solidFill>
+                  <a:srgbClr val="0070C0"/>
+                </a:solidFill>
+                <a:latin typeface="Tahoma" panose="020B0604030504040204" pitchFamily="34" charset="0"/>
+                <a:cs typeface="Tahoma" panose="020B0604030504040204" pitchFamily="34" charset="0"/>
+              </a:rPr>
+              <a:t>tác</a:t>
+            </a:r>
+            <a:r>
+              <a:rPr lang="en-US" sz="2000" dirty="0">
+                <a:solidFill>
+                  <a:srgbClr val="0070C0"/>
+                </a:solidFill>
+                <a:latin typeface="Tahoma" panose="020B0604030504040204" pitchFamily="34" charset="0"/>
+                <a:cs typeface="Tahoma" panose="020B0604030504040204" pitchFamily="34" charset="0"/>
+              </a:rPr>
+              <a:t> </a:t>
+            </a:r>
+            <a:r>
+              <a:rPr lang="en-US" sz="2000" dirty="0" err="1">
+                <a:solidFill>
+                  <a:srgbClr val="0070C0"/>
+                </a:solidFill>
+                <a:latin typeface="Tahoma" panose="020B0604030504040204" pitchFamily="34" charset="0"/>
+                <a:cs typeface="Tahoma" panose="020B0604030504040204" pitchFamily="34" charset="0"/>
+              </a:rPr>
+              <a:t>dụng</a:t>
+            </a:r>
+            <a:r>
+              <a:rPr lang="en-US" sz="2000" dirty="0">
+                <a:solidFill>
+                  <a:srgbClr val="0070C0"/>
+                </a:solidFill>
+                <a:latin typeface="Tahoma" panose="020B0604030504040204" pitchFamily="34" charset="0"/>
+                <a:cs typeface="Tahoma" panose="020B0604030504040204" pitchFamily="34" charset="0"/>
+              </a:rPr>
+              <a:t> </a:t>
+            </a:r>
+            <a:r>
+              <a:rPr lang="en-US" sz="2000" dirty="0" err="1">
+                <a:solidFill>
+                  <a:srgbClr val="0070C0"/>
+                </a:solidFill>
+                <a:latin typeface="Tahoma" panose="020B0604030504040204" pitchFamily="34" charset="0"/>
+                <a:cs typeface="Tahoma" panose="020B0604030504040204" pitchFamily="34" charset="0"/>
+              </a:rPr>
+              <a:t>phụ</a:t>
+            </a:r>
+            <a:r>
+              <a:rPr lang="en-US" sz="2000" dirty="0">
+                <a:solidFill>
+                  <a:srgbClr val="0070C0"/>
+                </a:solidFill>
+                <a:latin typeface="Tahoma" panose="020B0604030504040204" pitchFamily="34" charset="0"/>
+                <a:cs typeface="Tahoma" panose="020B0604030504040204" pitchFamily="34" charset="0"/>
+              </a:rPr>
+              <a:t> </a:t>
+            </a:r>
+            <a:r>
+              <a:rPr lang="en-US" sz="2000" dirty="0" err="1">
+                <a:solidFill>
+                  <a:srgbClr val="0070C0"/>
+                </a:solidFill>
+                <a:latin typeface="Tahoma" panose="020B0604030504040204" pitchFamily="34" charset="0"/>
+                <a:cs typeface="Tahoma" panose="020B0604030504040204" pitchFamily="34" charset="0"/>
+              </a:rPr>
+              <a:t>mà</a:t>
+            </a:r>
+            <a:r>
+              <a:rPr lang="en-US" sz="2000" dirty="0">
+                <a:solidFill>
+                  <a:srgbClr val="0070C0"/>
+                </a:solidFill>
+                <a:latin typeface="Tahoma" panose="020B0604030504040204" pitchFamily="34" charset="0"/>
+                <a:cs typeface="Tahoma" panose="020B0604030504040204" pitchFamily="34" charset="0"/>
+              </a:rPr>
+              <a:t> </a:t>
+            </a:r>
+            <a:r>
+              <a:rPr lang="en-US" sz="2000" dirty="0" err="1">
+                <a:solidFill>
+                  <a:srgbClr val="0070C0"/>
+                </a:solidFill>
+                <a:latin typeface="Tahoma" panose="020B0604030504040204" pitchFamily="34" charset="0"/>
+                <a:cs typeface="Tahoma" panose="020B0604030504040204" pitchFamily="34" charset="0"/>
+              </a:rPr>
+              <a:t>còn</a:t>
+            </a:r>
+            <a:r>
+              <a:rPr lang="en-US" sz="2000" dirty="0">
+                <a:solidFill>
+                  <a:srgbClr val="0070C0"/>
+                </a:solidFill>
+                <a:latin typeface="Tahoma" panose="020B0604030504040204" pitchFamily="34" charset="0"/>
+                <a:cs typeface="Tahoma" panose="020B0604030504040204" pitchFamily="34" charset="0"/>
+              </a:rPr>
+              <a:t> </a:t>
+            </a:r>
+            <a:r>
+              <a:rPr lang="en-US" sz="2000" dirty="0" err="1">
+                <a:solidFill>
+                  <a:srgbClr val="0070C0"/>
+                </a:solidFill>
+                <a:latin typeface="Tahoma" panose="020B0604030504040204" pitchFamily="34" charset="0"/>
+                <a:cs typeface="Tahoma" panose="020B0604030504040204" pitchFamily="34" charset="0"/>
+              </a:rPr>
+              <a:t>không</a:t>
+            </a:r>
+            <a:r>
+              <a:rPr lang="en-US" sz="2000" dirty="0">
+                <a:solidFill>
+                  <a:srgbClr val="0070C0"/>
+                </a:solidFill>
+                <a:latin typeface="Tahoma" panose="020B0604030504040204" pitchFamily="34" charset="0"/>
+                <a:cs typeface="Tahoma" panose="020B0604030504040204" pitchFamily="34" charset="0"/>
+              </a:rPr>
+              <a:t> </a:t>
+            </a:r>
+            <a:r>
+              <a:rPr lang="en-US" sz="2000" dirty="0" err="1">
+                <a:solidFill>
+                  <a:srgbClr val="0070C0"/>
+                </a:solidFill>
+                <a:latin typeface="Tahoma" panose="020B0604030504040204" pitchFamily="34" charset="0"/>
+                <a:cs typeface="Tahoma" panose="020B0604030504040204" pitchFamily="34" charset="0"/>
+              </a:rPr>
+              <a:t>dựa</a:t>
+            </a:r>
+            <a:r>
+              <a:rPr lang="en-US" sz="2000" dirty="0">
+                <a:solidFill>
+                  <a:srgbClr val="0070C0"/>
+                </a:solidFill>
+                <a:latin typeface="Tahoma" panose="020B0604030504040204" pitchFamily="34" charset="0"/>
+                <a:cs typeface="Tahoma" panose="020B0604030504040204" pitchFamily="34" charset="0"/>
+              </a:rPr>
+              <a:t> </a:t>
+            </a:r>
+            <a:r>
+              <a:rPr lang="en-US" sz="2000" dirty="0" err="1">
+                <a:solidFill>
+                  <a:srgbClr val="0070C0"/>
+                </a:solidFill>
+                <a:latin typeface="Tahoma" panose="020B0604030504040204" pitchFamily="34" charset="0"/>
+                <a:cs typeface="Tahoma" panose="020B0604030504040204" pitchFamily="34" charset="0"/>
+              </a:rPr>
+              <a:t>vào</a:t>
+            </a:r>
+            <a:r>
+              <a:rPr lang="en-US" sz="2000" dirty="0">
+                <a:solidFill>
+                  <a:srgbClr val="0070C0"/>
+                </a:solidFill>
+                <a:latin typeface="Tahoma" panose="020B0604030504040204" pitchFamily="34" charset="0"/>
+                <a:cs typeface="Tahoma" panose="020B0604030504040204" pitchFamily="34" charset="0"/>
+              </a:rPr>
+              <a:t> </a:t>
+            </a:r>
+            <a:r>
+              <a:rPr lang="en-US" sz="2000" dirty="0" err="1">
+                <a:solidFill>
+                  <a:srgbClr val="0070C0"/>
+                </a:solidFill>
+                <a:latin typeface="Tahoma" panose="020B0604030504040204" pitchFamily="34" charset="0"/>
+                <a:cs typeface="Tahoma" panose="020B0604030504040204" pitchFamily="34" charset="0"/>
+              </a:rPr>
+              <a:t>các</a:t>
+            </a:r>
+            <a:r>
+              <a:rPr lang="en-US" sz="2000" dirty="0">
+                <a:solidFill>
+                  <a:srgbClr val="0070C0"/>
+                </a:solidFill>
+                <a:latin typeface="Tahoma" panose="020B0604030504040204" pitchFamily="34" charset="0"/>
+                <a:cs typeface="Tahoma" panose="020B0604030504040204" pitchFamily="34" charset="0"/>
+              </a:rPr>
+              <a:t> </a:t>
+            </a:r>
+            <a:r>
+              <a:rPr lang="en-US" sz="2000" dirty="0" err="1">
+                <a:solidFill>
+                  <a:srgbClr val="0070C0"/>
+                </a:solidFill>
+                <a:latin typeface="Tahoma" panose="020B0604030504040204" pitchFamily="34" charset="0"/>
+                <a:cs typeface="Tahoma" panose="020B0604030504040204" pitchFamily="34" charset="0"/>
+              </a:rPr>
+              <a:t>tác</a:t>
+            </a:r>
+            <a:r>
+              <a:rPr lang="en-US" sz="2000" dirty="0">
+                <a:solidFill>
+                  <a:srgbClr val="0070C0"/>
+                </a:solidFill>
+                <a:latin typeface="Tahoma" panose="020B0604030504040204" pitchFamily="34" charset="0"/>
+                <a:cs typeface="Tahoma" panose="020B0604030504040204" pitchFamily="34" charset="0"/>
+              </a:rPr>
+              <a:t> </a:t>
+            </a:r>
+            <a:r>
+              <a:rPr lang="en-US" sz="2000" dirty="0" err="1">
+                <a:solidFill>
+                  <a:srgbClr val="0070C0"/>
+                </a:solidFill>
+                <a:latin typeface="Tahoma" panose="020B0604030504040204" pitchFamily="34" charset="0"/>
+                <a:cs typeface="Tahoma" panose="020B0604030504040204" pitchFamily="34" charset="0"/>
+              </a:rPr>
+              <a:t>dụng</a:t>
+            </a:r>
+            <a:r>
+              <a:rPr lang="en-US" sz="2000" dirty="0">
+                <a:solidFill>
+                  <a:srgbClr val="0070C0"/>
+                </a:solidFill>
+                <a:latin typeface="Tahoma" panose="020B0604030504040204" pitchFamily="34" charset="0"/>
+                <a:cs typeface="Tahoma" panose="020B0604030504040204" pitchFamily="34" charset="0"/>
+              </a:rPr>
+              <a:t> </a:t>
+            </a:r>
+            <a:r>
+              <a:rPr lang="en-US" sz="2000" dirty="0" err="1">
+                <a:solidFill>
+                  <a:srgbClr val="0070C0"/>
+                </a:solidFill>
+                <a:latin typeface="Tahoma" panose="020B0604030504040204" pitchFamily="34" charset="0"/>
+                <a:cs typeface="Tahoma" panose="020B0604030504040204" pitchFamily="34" charset="0"/>
+              </a:rPr>
+              <a:t>phụ</a:t>
+            </a:r>
+            <a:r>
+              <a:rPr lang="en-US" sz="2000" dirty="0">
+                <a:solidFill>
+                  <a:srgbClr val="0070C0"/>
+                </a:solidFill>
+                <a:latin typeface="Tahoma" panose="020B0604030504040204" pitchFamily="34" charset="0"/>
+                <a:cs typeface="Tahoma" panose="020B0604030504040204" pitchFamily="34" charset="0"/>
+              </a:rPr>
+              <a:t> </a:t>
+            </a:r>
+            <a:r>
+              <a:rPr lang="en-US" sz="2000" dirty="0" err="1">
+                <a:solidFill>
+                  <a:srgbClr val="0070C0"/>
+                </a:solidFill>
+                <a:latin typeface="Tahoma" panose="020B0604030504040204" pitchFamily="34" charset="0"/>
+                <a:cs typeface="Tahoma" panose="020B0604030504040204" pitchFamily="34" charset="0"/>
+              </a:rPr>
+              <a:t>từ</a:t>
+            </a:r>
+            <a:r>
+              <a:rPr lang="en-US" sz="2000" dirty="0">
+                <a:solidFill>
+                  <a:srgbClr val="0070C0"/>
+                </a:solidFill>
+                <a:latin typeface="Tahoma" panose="020B0604030504040204" pitchFamily="34" charset="0"/>
+                <a:cs typeface="Tahoma" panose="020B0604030504040204" pitchFamily="34" charset="0"/>
+              </a:rPr>
+              <a:t> </a:t>
+            </a:r>
+            <a:r>
+              <a:rPr lang="en-US" sz="2000" dirty="0" err="1">
+                <a:solidFill>
+                  <a:srgbClr val="0070C0"/>
+                </a:solidFill>
+                <a:latin typeface="Tahoma" panose="020B0604030504040204" pitchFamily="34" charset="0"/>
+                <a:cs typeface="Tahoma" panose="020B0604030504040204" pitchFamily="34" charset="0"/>
+              </a:rPr>
+              <a:t>mã</a:t>
+            </a:r>
+            <a:r>
+              <a:rPr lang="en-US" sz="2000" dirty="0">
+                <a:solidFill>
+                  <a:srgbClr val="0070C0"/>
+                </a:solidFill>
+                <a:latin typeface="Tahoma" panose="020B0604030504040204" pitchFamily="34" charset="0"/>
+                <a:cs typeface="Tahoma" panose="020B0604030504040204" pitchFamily="34" charset="0"/>
+              </a:rPr>
+              <a:t> </a:t>
+            </a:r>
+            <a:r>
+              <a:rPr lang="en-US" sz="2000" dirty="0" err="1">
+                <a:solidFill>
+                  <a:srgbClr val="0070C0"/>
+                </a:solidFill>
+                <a:latin typeface="Tahoma" panose="020B0604030504040204" pitchFamily="34" charset="0"/>
+                <a:cs typeface="Tahoma" panose="020B0604030504040204" pitchFamily="34" charset="0"/>
+              </a:rPr>
+              <a:t>khác</a:t>
+            </a:r>
+            <a:r>
+              <a:rPr lang="en-US" sz="2000" dirty="0">
+                <a:solidFill>
+                  <a:srgbClr val="0070C0"/>
+                </a:solidFill>
+                <a:latin typeface="Tahoma" panose="020B0604030504040204" pitchFamily="34" charset="0"/>
+                <a:cs typeface="Tahoma" panose="020B0604030504040204" pitchFamily="34" charset="0"/>
+              </a:rPr>
+              <a:t>, </a:t>
+            </a:r>
+            <a:r>
+              <a:rPr lang="en-US" sz="2000" dirty="0" err="1">
+                <a:solidFill>
+                  <a:srgbClr val="0070C0"/>
+                </a:solidFill>
+                <a:latin typeface="Tahoma" panose="020B0604030504040204" pitchFamily="34" charset="0"/>
+                <a:cs typeface="Tahoma" panose="020B0604030504040204" pitchFamily="34" charset="0"/>
+              </a:rPr>
+              <a:t>ví</a:t>
+            </a:r>
+            <a:r>
+              <a:rPr lang="en-US" sz="2000" dirty="0">
+                <a:solidFill>
+                  <a:srgbClr val="0070C0"/>
+                </a:solidFill>
+                <a:latin typeface="Tahoma" panose="020B0604030504040204" pitchFamily="34" charset="0"/>
+                <a:cs typeface="Tahoma" panose="020B0604030504040204" pitchFamily="34" charset="0"/>
+              </a:rPr>
+              <a:t> </a:t>
+            </a:r>
+            <a:r>
+              <a:rPr lang="en-US" sz="2000" dirty="0" err="1">
+                <a:solidFill>
+                  <a:srgbClr val="0070C0"/>
+                </a:solidFill>
+                <a:latin typeface="Tahoma" panose="020B0604030504040204" pitchFamily="34" charset="0"/>
+                <a:cs typeface="Tahoma" panose="020B0604030504040204" pitchFamily="34" charset="0"/>
+              </a:rPr>
+              <a:t>dụ</a:t>
+            </a:r>
+            <a:r>
+              <a:rPr lang="en-US" sz="2000" dirty="0">
+                <a:solidFill>
+                  <a:srgbClr val="0070C0"/>
+                </a:solidFill>
+                <a:latin typeface="Tahoma" panose="020B0604030504040204" pitchFamily="34" charset="0"/>
+                <a:cs typeface="Tahoma" panose="020B0604030504040204" pitchFamily="34" charset="0"/>
+              </a:rPr>
+              <a:t>, </a:t>
+            </a:r>
+            <a:r>
+              <a:rPr lang="en-US" sz="2000" dirty="0" err="1">
+                <a:solidFill>
+                  <a:srgbClr val="0070C0"/>
+                </a:solidFill>
+                <a:latin typeface="Tahoma" panose="020B0604030504040204" pitchFamily="34" charset="0"/>
+                <a:cs typeface="Tahoma" panose="020B0604030504040204" pitchFamily="34" charset="0"/>
+              </a:rPr>
+              <a:t>nó</a:t>
+            </a:r>
+            <a:r>
+              <a:rPr lang="en-US" sz="2000" dirty="0">
+                <a:solidFill>
+                  <a:srgbClr val="0070C0"/>
+                </a:solidFill>
+                <a:latin typeface="Tahoma" panose="020B0604030504040204" pitchFamily="34" charset="0"/>
+                <a:cs typeface="Tahoma" panose="020B0604030504040204" pitchFamily="34" charset="0"/>
+              </a:rPr>
+              <a:t> </a:t>
+            </a:r>
+            <a:r>
+              <a:rPr lang="en-US" sz="2000" dirty="0" err="1">
+                <a:solidFill>
+                  <a:srgbClr val="0070C0"/>
+                </a:solidFill>
+                <a:latin typeface="Tahoma" panose="020B0604030504040204" pitchFamily="34" charset="0"/>
+                <a:cs typeface="Tahoma" panose="020B0604030504040204" pitchFamily="34" charset="0"/>
+              </a:rPr>
+              <a:t>không</a:t>
+            </a:r>
+            <a:r>
+              <a:rPr lang="en-US" sz="2000" dirty="0">
+                <a:solidFill>
+                  <a:srgbClr val="0070C0"/>
+                </a:solidFill>
+                <a:latin typeface="Tahoma" panose="020B0604030504040204" pitchFamily="34" charset="0"/>
+                <a:cs typeface="Tahoma" panose="020B0604030504040204" pitchFamily="34" charset="0"/>
+              </a:rPr>
+              <a:t> </a:t>
+            </a:r>
+            <a:r>
+              <a:rPr lang="en-US" sz="2000" dirty="0" err="1">
+                <a:solidFill>
+                  <a:srgbClr val="0070C0"/>
+                </a:solidFill>
+                <a:latin typeface="Tahoma" panose="020B0604030504040204" pitchFamily="34" charset="0"/>
+                <a:cs typeface="Tahoma" panose="020B0604030504040204" pitchFamily="34" charset="0"/>
+              </a:rPr>
+              <a:t>đọc</a:t>
+            </a:r>
+            <a:r>
+              <a:rPr lang="en-US" sz="2000" dirty="0">
+                <a:solidFill>
+                  <a:srgbClr val="0070C0"/>
+                </a:solidFill>
+                <a:latin typeface="Tahoma" panose="020B0604030504040204" pitchFamily="34" charset="0"/>
+                <a:cs typeface="Tahoma" panose="020B0604030504040204" pitchFamily="34" charset="0"/>
+              </a:rPr>
+              <a:t> </a:t>
+            </a:r>
+            <a:r>
+              <a:rPr lang="en-US" sz="2000" dirty="0" err="1">
+                <a:solidFill>
+                  <a:srgbClr val="0070C0"/>
+                </a:solidFill>
+                <a:latin typeface="Tahoma" panose="020B0604030504040204" pitchFamily="34" charset="0"/>
+                <a:cs typeface="Tahoma" panose="020B0604030504040204" pitchFamily="34" charset="0"/>
+              </a:rPr>
+              <a:t>các</a:t>
+            </a:r>
+            <a:r>
+              <a:rPr lang="en-US" sz="2000" dirty="0">
+                <a:solidFill>
+                  <a:srgbClr val="0070C0"/>
+                </a:solidFill>
+                <a:latin typeface="Tahoma" panose="020B0604030504040204" pitchFamily="34" charset="0"/>
+                <a:cs typeface="Tahoma" panose="020B0604030504040204" pitchFamily="34" charset="0"/>
+              </a:rPr>
+              <a:t> </a:t>
+            </a:r>
+            <a:r>
+              <a:rPr lang="en-US" sz="2000" dirty="0" smtClean="0">
+                <a:solidFill>
+                  <a:srgbClr val="0070C0"/>
+                </a:solidFill>
+                <a:latin typeface="Tahoma" panose="020B0604030504040204" pitchFamily="34" charset="0"/>
+                <a:cs typeface="Tahoma" panose="020B0604030504040204" pitchFamily="34" charset="0"/>
+              </a:rPr>
+              <a:t>global biding </a:t>
+            </a:r>
+            <a:r>
+              <a:rPr lang="en-US" sz="2000" dirty="0" err="1" smtClean="0">
+                <a:solidFill>
+                  <a:srgbClr val="0070C0"/>
+                </a:solidFill>
+                <a:latin typeface="Tahoma" panose="020B0604030504040204" pitchFamily="34" charset="0"/>
+                <a:cs typeface="Tahoma" panose="020B0604030504040204" pitchFamily="34" charset="0"/>
+              </a:rPr>
+              <a:t>mà</a:t>
+            </a:r>
+            <a:r>
+              <a:rPr lang="en-US" sz="2000" dirty="0" smtClean="0">
+                <a:solidFill>
+                  <a:srgbClr val="0070C0"/>
+                </a:solidFill>
+                <a:latin typeface="Tahoma" panose="020B0604030504040204" pitchFamily="34" charset="0"/>
+                <a:cs typeface="Tahoma" panose="020B0604030504040204" pitchFamily="34" charset="0"/>
+              </a:rPr>
+              <a:t> </a:t>
+            </a:r>
+            <a:r>
+              <a:rPr lang="en-US" sz="2000" dirty="0" err="1">
+                <a:solidFill>
+                  <a:srgbClr val="0070C0"/>
+                </a:solidFill>
+                <a:latin typeface="Tahoma" panose="020B0604030504040204" pitchFamily="34" charset="0"/>
+                <a:cs typeface="Tahoma" panose="020B0604030504040204" pitchFamily="34" charset="0"/>
+              </a:rPr>
+              <a:t>giá</a:t>
+            </a:r>
+            <a:r>
+              <a:rPr lang="en-US" sz="2000" dirty="0">
+                <a:solidFill>
+                  <a:srgbClr val="0070C0"/>
+                </a:solidFill>
+                <a:latin typeface="Tahoma" panose="020B0604030504040204" pitchFamily="34" charset="0"/>
+                <a:cs typeface="Tahoma" panose="020B0604030504040204" pitchFamily="34" charset="0"/>
+              </a:rPr>
+              <a:t> </a:t>
+            </a:r>
+            <a:r>
+              <a:rPr lang="en-US" sz="2000" dirty="0" err="1">
+                <a:solidFill>
+                  <a:srgbClr val="0070C0"/>
+                </a:solidFill>
+                <a:latin typeface="Tahoma" panose="020B0604030504040204" pitchFamily="34" charset="0"/>
+                <a:cs typeface="Tahoma" panose="020B0604030504040204" pitchFamily="34" charset="0"/>
+              </a:rPr>
+              <a:t>trị</a:t>
+            </a:r>
+            <a:r>
+              <a:rPr lang="en-US" sz="2000" dirty="0">
+                <a:solidFill>
+                  <a:srgbClr val="0070C0"/>
+                </a:solidFill>
+                <a:latin typeface="Tahoma" panose="020B0604030504040204" pitchFamily="34" charset="0"/>
+                <a:cs typeface="Tahoma" panose="020B0604030504040204" pitchFamily="34" charset="0"/>
+              </a:rPr>
+              <a:t> </a:t>
+            </a:r>
+            <a:r>
+              <a:rPr lang="en-US" sz="2000" dirty="0" err="1">
+                <a:solidFill>
+                  <a:srgbClr val="0070C0"/>
+                </a:solidFill>
+                <a:latin typeface="Tahoma" panose="020B0604030504040204" pitchFamily="34" charset="0"/>
+                <a:cs typeface="Tahoma" panose="020B0604030504040204" pitchFamily="34" charset="0"/>
+              </a:rPr>
+              <a:t>có</a:t>
+            </a:r>
+            <a:r>
+              <a:rPr lang="en-US" sz="2000" dirty="0">
+                <a:solidFill>
+                  <a:srgbClr val="0070C0"/>
+                </a:solidFill>
+                <a:latin typeface="Tahoma" panose="020B0604030504040204" pitchFamily="34" charset="0"/>
+                <a:cs typeface="Tahoma" panose="020B0604030504040204" pitchFamily="34" charset="0"/>
+              </a:rPr>
+              <a:t> </a:t>
+            </a:r>
+            <a:r>
+              <a:rPr lang="en-US" sz="2000" dirty="0" err="1">
+                <a:solidFill>
+                  <a:srgbClr val="0070C0"/>
+                </a:solidFill>
+                <a:latin typeface="Tahoma" panose="020B0604030504040204" pitchFamily="34" charset="0"/>
+                <a:cs typeface="Tahoma" panose="020B0604030504040204" pitchFamily="34" charset="0"/>
+              </a:rPr>
+              <a:t>thể</a:t>
+            </a:r>
+            <a:r>
+              <a:rPr lang="en-US" sz="2000" dirty="0">
+                <a:solidFill>
+                  <a:srgbClr val="0070C0"/>
+                </a:solidFill>
+                <a:latin typeface="Tahoma" panose="020B0604030504040204" pitchFamily="34" charset="0"/>
+                <a:cs typeface="Tahoma" panose="020B0604030504040204" pitchFamily="34" charset="0"/>
+              </a:rPr>
+              <a:t> </a:t>
+            </a:r>
+            <a:r>
+              <a:rPr lang="en-US" sz="2000" dirty="0" err="1">
+                <a:solidFill>
+                  <a:srgbClr val="0070C0"/>
+                </a:solidFill>
+                <a:latin typeface="Tahoma" panose="020B0604030504040204" pitchFamily="34" charset="0"/>
+                <a:cs typeface="Tahoma" panose="020B0604030504040204" pitchFamily="34" charset="0"/>
+              </a:rPr>
+              <a:t>thay</a:t>
+            </a:r>
+            <a:r>
+              <a:rPr lang="en-US" sz="2000" dirty="0">
+                <a:solidFill>
+                  <a:srgbClr val="0070C0"/>
+                </a:solidFill>
+                <a:latin typeface="Tahoma" panose="020B0604030504040204" pitchFamily="34" charset="0"/>
+                <a:cs typeface="Tahoma" panose="020B0604030504040204" pitchFamily="34" charset="0"/>
+              </a:rPr>
+              <a:t> </a:t>
+            </a:r>
+            <a:r>
+              <a:rPr lang="en-US" sz="2000" dirty="0" err="1">
+                <a:solidFill>
+                  <a:srgbClr val="0070C0"/>
+                </a:solidFill>
+                <a:latin typeface="Tahoma" panose="020B0604030504040204" pitchFamily="34" charset="0"/>
+                <a:cs typeface="Tahoma" panose="020B0604030504040204" pitchFamily="34" charset="0"/>
+              </a:rPr>
+              <a:t>đổi</a:t>
+            </a:r>
+            <a:r>
+              <a:rPr lang="en-US" sz="2000" dirty="0">
+                <a:solidFill>
+                  <a:srgbClr val="0070C0"/>
+                </a:solidFill>
+                <a:latin typeface="Tahoma" panose="020B0604030504040204" pitchFamily="34" charset="0"/>
+                <a:cs typeface="Tahoma" panose="020B0604030504040204" pitchFamily="34" charset="0"/>
+              </a:rPr>
+              <a:t>.</a:t>
+            </a:r>
+          </a:p>
+        </p:txBody>
+      </p:sp>
+      <p:sp>
+        <p:nvSpPr>
+          <p:cNvPr id="4" name="Slide Number Placeholder 3"/>
+          <p:cNvSpPr>
+            <a:spLocks noGrp="1"/>
+          </p:cNvSpPr>
+          <p:nvPr>
+            <p:ph type="sldNum" sz="quarter" idx="12"/>
+          </p:nvPr>
+        </p:nvSpPr>
+        <p:spPr/>
+        <p:txBody>
+          <a:bodyPr/>
+          <a:lstStyle/>
+          <a:p>
+            <a:fld id="{D57F1E4F-1CFF-5643-939E-217C01CDF565}" type="slidenum">
+              <a:rPr lang="en-US" smtClean="0"/>
+              <a:pPr/>
+              <a:t>9</a:t>
+            </a:fld>
+            <a:endParaRPr lang="en-US" dirty="0"/>
+          </a:p>
+        </p:txBody>
+      </p:sp>
+    </p:spTree>
+    <p:extLst>
+      <p:ext uri="{BB962C8B-B14F-4D97-AF65-F5344CB8AC3E}">
+        <p14:creationId xmlns:p14="http://schemas.microsoft.com/office/powerpoint/2010/main" val="2919144367"/>
       </p:ext>
     </p:extLst>
   </p:cSld>

</xml_diff>